<commit_message>
2: Upload HTML. Update PPT for 4:3
</commit_message>
<xml_diff>
--- a/2-september-27-practical-html/2-september-27-practical-html.pptx
+++ b/2-september-27-practical-html/2-september-27-practical-html.pptx
@@ -2,7 +2,7 @@
 <file path=ppt/presentation.xml><?xml version="1.0" encoding="utf-8"?>
 <p:presentation xmlns:a="http://schemas.openxmlformats.org/drawingml/2006/main" xmlns:r="http://schemas.openxmlformats.org/officeDocument/2006/relationships" xmlns:p="http://schemas.openxmlformats.org/presentationml/2006/main" saveSubsetFonts="1">
   <p:sldMasterIdLst>
-    <p:sldMasterId id="2147483648" r:id="rId1"/>
+    <p:sldMasterId id="2147483660" r:id="rId1"/>
   </p:sldMasterIdLst>
   <p:notesMasterIdLst>
     <p:notesMasterId r:id="rId9"/>
@@ -16,7 +16,7 @@
     <p:sldId id="276" r:id="rId7"/>
     <p:sldId id="273" r:id="rId8"/>
   </p:sldIdLst>
-  <p:sldSz cx="12192000" cy="6858000"/>
+  <p:sldSz cx="9144000" cy="6858000" type="screen4x3"/>
   <p:notesSz cx="6858000" cy="9144000"/>
   <p:defaultTextStyle>
     <a:defPPr>
@@ -203,7 +203,7 @@
           <a:p>
             <a:fld id="{FE4A3F17-6902-4FEE-977D-73F85C3340A9}" type="datetimeFigureOut">
               <a:rPr lang="en-US" smtClean="0"/>
-              <a:t>9/26/2017</a:t>
+              <a:t>9/27/2017</a:t>
             </a:fld>
             <a:endParaRPr lang="en-US"/>
           </a:p>
@@ -221,8 +221,8 @@
         </p:nvSpPr>
         <p:spPr>
           <a:xfrm>
-            <a:off x="685800" y="1143000"/>
-            <a:ext cx="5486400" cy="3086100"/>
+            <a:off x="1371600" y="1143000"/>
+            <a:ext cx="4114800" cy="3086100"/>
           </a:xfrm>
           <a:prstGeom prst="rect">
             <a:avLst/>
@@ -498,7 +498,12 @@
             <p:ph type="sldImg"/>
           </p:nvPr>
         </p:nvSpPr>
-        <p:spPr/>
+        <p:spPr>
+          <a:xfrm>
+            <a:off x="1371600" y="1143000"/>
+            <a:ext cx="4114800" cy="3086100"/>
+          </a:xfrm>
+        </p:spPr>
       </p:sp>
       <p:sp>
         <p:nvSpPr>
@@ -582,7 +587,12 @@
             <p:ph type="sldImg"/>
           </p:nvPr>
         </p:nvSpPr>
-        <p:spPr/>
+        <p:spPr>
+          <a:xfrm>
+            <a:off x="1371600" y="1143000"/>
+            <a:ext cx="4114800" cy="3086100"/>
+          </a:xfrm>
+        </p:spPr>
       </p:sp>
       <p:sp>
         <p:nvSpPr>
@@ -668,8 +678,8 @@
         </p:nvSpPr>
         <p:spPr>
           <a:xfrm>
-            <a:off x="1524000" y="1122363"/>
-            <a:ext cx="9144000" cy="2387600"/>
+            <a:off x="685800" y="1122363"/>
+            <a:ext cx="7772400" cy="2387600"/>
           </a:xfrm>
         </p:spPr>
         <p:txBody>
@@ -684,7 +694,7 @@
               <a:rPr lang="en-US" smtClean="0"/>
               <a:t>Click to edit Master title style</a:t>
             </a:r>
-            <a:endParaRPr lang="en-US"/>
+            <a:endParaRPr lang="en-US" dirty="0"/>
           </a:p>
         </p:txBody>
       </p:sp>
@@ -700,8 +710,8 @@
         </p:nvSpPr>
         <p:spPr>
           <a:xfrm>
-            <a:off x="1524000" y="3602038"/>
-            <a:ext cx="9144000" cy="1655762"/>
+            <a:off x="1143000" y="3602038"/>
+            <a:ext cx="6858000" cy="1655762"/>
           </a:xfrm>
         </p:spPr>
         <p:txBody>
@@ -749,7 +759,7 @@
               <a:rPr lang="en-US" smtClean="0"/>
               <a:t>Click to edit Master subtitle style</a:t>
             </a:r>
-            <a:endParaRPr lang="en-US"/>
+            <a:endParaRPr lang="en-US" dirty="0"/>
           </a:p>
         </p:txBody>
       </p:sp>
@@ -770,7 +780,7 @@
           <a:p>
             <a:fld id="{AE6754AF-6855-4FBF-9F06-D96142EEC6BA}" type="datetimeFigureOut">
               <a:rPr lang="en-US" smtClean="0"/>
-              <a:t>9/26/2017</a:t>
+              <a:t>9/27/2017</a:t>
             </a:fld>
             <a:endParaRPr lang="en-US"/>
           </a:p>
@@ -821,7 +831,7 @@
     </p:spTree>
     <p:extLst>
       <p:ext uri="{BB962C8B-B14F-4D97-AF65-F5344CB8AC3E}">
-        <p14:creationId xmlns:p14="http://schemas.microsoft.com/office/powerpoint/2010/main" val="2423410436"/>
+        <p14:creationId xmlns:p14="http://schemas.microsoft.com/office/powerpoint/2010/main" val="341885760"/>
       </p:ext>
     </p:extLst>
   </p:cSld>
@@ -867,7 +877,7 @@
               <a:rPr lang="en-US" smtClean="0"/>
               <a:t>Click to edit Master title style</a:t>
             </a:r>
-            <a:endParaRPr lang="en-US"/>
+            <a:endParaRPr lang="en-US" dirty="0"/>
           </a:p>
         </p:txBody>
       </p:sp>
@@ -919,7 +929,7 @@
               <a:rPr lang="en-US" smtClean="0"/>
               <a:t>Fifth level</a:t>
             </a:r>
-            <a:endParaRPr lang="en-US"/>
+            <a:endParaRPr lang="en-US" dirty="0"/>
           </a:p>
         </p:txBody>
       </p:sp>
@@ -940,7 +950,7 @@
           <a:p>
             <a:fld id="{AE6754AF-6855-4FBF-9F06-D96142EEC6BA}" type="datetimeFigureOut">
               <a:rPr lang="en-US" smtClean="0"/>
-              <a:t>9/26/2017</a:t>
+              <a:t>9/27/2017</a:t>
             </a:fld>
             <a:endParaRPr lang="en-US"/>
           </a:p>
@@ -991,7 +1001,7 @@
     </p:spTree>
     <p:extLst>
       <p:ext uri="{BB962C8B-B14F-4D97-AF65-F5344CB8AC3E}">
-        <p14:creationId xmlns:p14="http://schemas.microsoft.com/office/powerpoint/2010/main" val="4099165219"/>
+        <p14:creationId xmlns:p14="http://schemas.microsoft.com/office/powerpoint/2010/main" val="1967856925"/>
       </p:ext>
     </p:extLst>
   </p:cSld>
@@ -1030,8 +1040,8 @@
         </p:nvSpPr>
         <p:spPr>
           <a:xfrm>
-            <a:off x="8724900" y="365125"/>
-            <a:ext cx="2628900" cy="5811838"/>
+            <a:off x="6543675" y="365125"/>
+            <a:ext cx="1971675" cy="5811838"/>
           </a:xfrm>
         </p:spPr>
         <p:txBody>
@@ -1042,7 +1052,7 @@
               <a:rPr lang="en-US" smtClean="0"/>
               <a:t>Click to edit Master title style</a:t>
             </a:r>
-            <a:endParaRPr lang="en-US"/>
+            <a:endParaRPr lang="en-US" dirty="0"/>
           </a:p>
         </p:txBody>
       </p:sp>
@@ -1058,8 +1068,8 @@
         </p:nvSpPr>
         <p:spPr>
           <a:xfrm>
-            <a:off x="838200" y="365125"/>
-            <a:ext cx="7734300" cy="5811838"/>
+            <a:off x="628650" y="365125"/>
+            <a:ext cx="5800725" cy="5811838"/>
           </a:xfrm>
         </p:spPr>
         <p:txBody>
@@ -1099,7 +1109,7 @@
               <a:rPr lang="en-US" smtClean="0"/>
               <a:t>Fifth level</a:t>
             </a:r>
-            <a:endParaRPr lang="en-US"/>
+            <a:endParaRPr lang="en-US" dirty="0"/>
           </a:p>
         </p:txBody>
       </p:sp>
@@ -1120,7 +1130,7 @@
           <a:p>
             <a:fld id="{AE6754AF-6855-4FBF-9F06-D96142EEC6BA}" type="datetimeFigureOut">
               <a:rPr lang="en-US" smtClean="0"/>
-              <a:t>9/26/2017</a:t>
+              <a:t>9/27/2017</a:t>
             </a:fld>
             <a:endParaRPr lang="en-US"/>
           </a:p>
@@ -1171,7 +1181,7 @@
     </p:spTree>
     <p:extLst>
       <p:ext uri="{BB962C8B-B14F-4D97-AF65-F5344CB8AC3E}">
-        <p14:creationId xmlns:p14="http://schemas.microsoft.com/office/powerpoint/2010/main" val="3308024077"/>
+        <p14:creationId xmlns:p14="http://schemas.microsoft.com/office/powerpoint/2010/main" val="3095312228"/>
       </p:ext>
     </p:extLst>
   </p:cSld>
@@ -1217,7 +1227,7 @@
               <a:rPr lang="en-US" smtClean="0"/>
               <a:t>Click to edit Master title style</a:t>
             </a:r>
-            <a:endParaRPr lang="en-US"/>
+            <a:endParaRPr lang="en-US" dirty="0"/>
           </a:p>
         </p:txBody>
       </p:sp>
@@ -1269,7 +1279,7 @@
               <a:rPr lang="en-US" smtClean="0"/>
               <a:t>Fifth level</a:t>
             </a:r>
-            <a:endParaRPr lang="en-US"/>
+            <a:endParaRPr lang="en-US" dirty="0"/>
           </a:p>
         </p:txBody>
       </p:sp>
@@ -1290,7 +1300,7 @@
           <a:p>
             <a:fld id="{AE6754AF-6855-4FBF-9F06-D96142EEC6BA}" type="datetimeFigureOut">
               <a:rPr lang="en-US" smtClean="0"/>
-              <a:t>9/26/2017</a:t>
+              <a:t>9/27/2017</a:t>
             </a:fld>
             <a:endParaRPr lang="en-US"/>
           </a:p>
@@ -1341,7 +1351,7 @@
     </p:spTree>
     <p:extLst>
       <p:ext uri="{BB962C8B-B14F-4D97-AF65-F5344CB8AC3E}">
-        <p14:creationId xmlns:p14="http://schemas.microsoft.com/office/powerpoint/2010/main" val="3450291288"/>
+        <p14:creationId xmlns:p14="http://schemas.microsoft.com/office/powerpoint/2010/main" val="3505681495"/>
       </p:ext>
     </p:extLst>
   </p:cSld>
@@ -1380,8 +1390,8 @@
         </p:nvSpPr>
         <p:spPr>
           <a:xfrm>
-            <a:off x="831850" y="1709738"/>
-            <a:ext cx="10515600" cy="2852737"/>
+            <a:off x="623888" y="1709739"/>
+            <a:ext cx="7886700" cy="2852737"/>
           </a:xfrm>
         </p:spPr>
         <p:txBody>
@@ -1396,7 +1406,7 @@
               <a:rPr lang="en-US" smtClean="0"/>
               <a:t>Click to edit Master title style</a:t>
             </a:r>
-            <a:endParaRPr lang="en-US"/>
+            <a:endParaRPr lang="en-US" dirty="0"/>
           </a:p>
         </p:txBody>
       </p:sp>
@@ -1412,8 +1422,8 @@
         </p:nvSpPr>
         <p:spPr>
           <a:xfrm>
-            <a:off x="831850" y="4589463"/>
-            <a:ext cx="10515600" cy="1500187"/>
+            <a:off x="623888" y="4589464"/>
+            <a:ext cx="7886700" cy="1500187"/>
           </a:xfrm>
         </p:spPr>
         <p:txBody>
@@ -1423,9 +1433,7 @@
               <a:buNone/>
               <a:defRPr sz="2400">
                 <a:solidFill>
-                  <a:schemeClr val="tx1">
-                    <a:tint val="75000"/>
-                  </a:schemeClr>
+                  <a:schemeClr val="tx1"/>
                 </a:solidFill>
               </a:defRPr>
             </a:lvl1pPr>
@@ -1536,7 +1544,7 @@
           <a:p>
             <a:fld id="{AE6754AF-6855-4FBF-9F06-D96142EEC6BA}" type="datetimeFigureOut">
               <a:rPr lang="en-US" smtClean="0"/>
-              <a:t>9/26/2017</a:t>
+              <a:t>9/27/2017</a:t>
             </a:fld>
             <a:endParaRPr lang="en-US"/>
           </a:p>
@@ -1587,7 +1595,7 @@
     </p:spTree>
     <p:extLst>
       <p:ext uri="{BB962C8B-B14F-4D97-AF65-F5344CB8AC3E}">
-        <p14:creationId xmlns:p14="http://schemas.microsoft.com/office/powerpoint/2010/main" val="2569124932"/>
+        <p14:creationId xmlns:p14="http://schemas.microsoft.com/office/powerpoint/2010/main" val="391062698"/>
       </p:ext>
     </p:extLst>
   </p:cSld>
@@ -1633,7 +1641,7 @@
               <a:rPr lang="en-US" smtClean="0"/>
               <a:t>Click to edit Master title style</a:t>
             </a:r>
-            <a:endParaRPr lang="en-US"/>
+            <a:endParaRPr lang="en-US" dirty="0"/>
           </a:p>
         </p:txBody>
       </p:sp>
@@ -1649,8 +1657,8 @@
         </p:nvSpPr>
         <p:spPr>
           <a:xfrm>
-            <a:off x="838200" y="1825625"/>
-            <a:ext cx="5181600" cy="4351338"/>
+            <a:off x="628650" y="1825625"/>
+            <a:ext cx="3886200" cy="4351338"/>
           </a:xfrm>
         </p:spPr>
         <p:txBody>
@@ -1690,7 +1698,7 @@
               <a:rPr lang="en-US" smtClean="0"/>
               <a:t>Fifth level</a:t>
             </a:r>
-            <a:endParaRPr lang="en-US"/>
+            <a:endParaRPr lang="en-US" dirty="0"/>
           </a:p>
         </p:txBody>
       </p:sp>
@@ -1706,8 +1714,8 @@
         </p:nvSpPr>
         <p:spPr>
           <a:xfrm>
-            <a:off x="6172200" y="1825625"/>
-            <a:ext cx="5181600" cy="4351338"/>
+            <a:off x="4629150" y="1825625"/>
+            <a:ext cx="3886200" cy="4351338"/>
           </a:xfrm>
         </p:spPr>
         <p:txBody>
@@ -1747,7 +1755,7 @@
               <a:rPr lang="en-US" smtClean="0"/>
               <a:t>Fifth level</a:t>
             </a:r>
-            <a:endParaRPr lang="en-US"/>
+            <a:endParaRPr lang="en-US" dirty="0"/>
           </a:p>
         </p:txBody>
       </p:sp>
@@ -1768,7 +1776,7 @@
           <a:p>
             <a:fld id="{AE6754AF-6855-4FBF-9F06-D96142EEC6BA}" type="datetimeFigureOut">
               <a:rPr lang="en-US" smtClean="0"/>
-              <a:t>9/26/2017</a:t>
+              <a:t>9/27/2017</a:t>
             </a:fld>
             <a:endParaRPr lang="en-US"/>
           </a:p>
@@ -1819,7 +1827,7 @@
     </p:spTree>
     <p:extLst>
       <p:ext uri="{BB962C8B-B14F-4D97-AF65-F5344CB8AC3E}">
-        <p14:creationId xmlns:p14="http://schemas.microsoft.com/office/powerpoint/2010/main" val="3382113186"/>
+        <p14:creationId xmlns:p14="http://schemas.microsoft.com/office/powerpoint/2010/main" val="2986598870"/>
       </p:ext>
     </p:extLst>
   </p:cSld>
@@ -1858,8 +1866,8 @@
         </p:nvSpPr>
         <p:spPr>
           <a:xfrm>
-            <a:off x="839788" y="365125"/>
-            <a:ext cx="10515600" cy="1325563"/>
+            <a:off x="629841" y="365126"/>
+            <a:ext cx="7886700" cy="1325563"/>
           </a:xfrm>
         </p:spPr>
         <p:txBody>
@@ -1870,7 +1878,7 @@
               <a:rPr lang="en-US" smtClean="0"/>
               <a:t>Click to edit Master title style</a:t>
             </a:r>
-            <a:endParaRPr lang="en-US"/>
+            <a:endParaRPr lang="en-US" dirty="0"/>
           </a:p>
         </p:txBody>
       </p:sp>
@@ -1886,8 +1894,8 @@
         </p:nvSpPr>
         <p:spPr>
           <a:xfrm>
-            <a:off x="839788" y="1681163"/>
-            <a:ext cx="5157787" cy="823912"/>
+            <a:off x="629842" y="1681163"/>
+            <a:ext cx="3868340" cy="823912"/>
           </a:xfrm>
         </p:spPr>
         <p:txBody>
@@ -1951,8 +1959,8 @@
         </p:nvSpPr>
         <p:spPr>
           <a:xfrm>
-            <a:off x="839788" y="2505075"/>
-            <a:ext cx="5157787" cy="3684588"/>
+            <a:off x="629842" y="2505075"/>
+            <a:ext cx="3868340" cy="3684588"/>
           </a:xfrm>
         </p:spPr>
         <p:txBody>
@@ -1992,7 +2000,7 @@
               <a:rPr lang="en-US" smtClean="0"/>
               <a:t>Fifth level</a:t>
             </a:r>
-            <a:endParaRPr lang="en-US"/>
+            <a:endParaRPr lang="en-US" dirty="0"/>
           </a:p>
         </p:txBody>
       </p:sp>
@@ -2008,8 +2016,8 @@
         </p:nvSpPr>
         <p:spPr>
           <a:xfrm>
-            <a:off x="6172200" y="1681163"/>
-            <a:ext cx="5183188" cy="823912"/>
+            <a:off x="4629150" y="1681163"/>
+            <a:ext cx="3887391" cy="823912"/>
           </a:xfrm>
         </p:spPr>
         <p:txBody>
@@ -2073,8 +2081,8 @@
         </p:nvSpPr>
         <p:spPr>
           <a:xfrm>
-            <a:off x="6172200" y="2505075"/>
-            <a:ext cx="5183188" cy="3684588"/>
+            <a:off x="4629150" y="2505075"/>
+            <a:ext cx="3887391" cy="3684588"/>
           </a:xfrm>
         </p:spPr>
         <p:txBody>
@@ -2114,7 +2122,7 @@
               <a:rPr lang="en-US" smtClean="0"/>
               <a:t>Fifth level</a:t>
             </a:r>
-            <a:endParaRPr lang="en-US"/>
+            <a:endParaRPr lang="en-US" dirty="0"/>
           </a:p>
         </p:txBody>
       </p:sp>
@@ -2135,7 +2143,7 @@
           <a:p>
             <a:fld id="{AE6754AF-6855-4FBF-9F06-D96142EEC6BA}" type="datetimeFigureOut">
               <a:rPr lang="en-US" smtClean="0"/>
-              <a:t>9/26/2017</a:t>
+              <a:t>9/27/2017</a:t>
             </a:fld>
             <a:endParaRPr lang="en-US"/>
           </a:p>
@@ -2186,7 +2194,7 @@
     </p:spTree>
     <p:extLst>
       <p:ext uri="{BB962C8B-B14F-4D97-AF65-F5344CB8AC3E}">
-        <p14:creationId xmlns:p14="http://schemas.microsoft.com/office/powerpoint/2010/main" val="2583852083"/>
+        <p14:creationId xmlns:p14="http://schemas.microsoft.com/office/powerpoint/2010/main" val="2991168832"/>
       </p:ext>
     </p:extLst>
   </p:cSld>
@@ -2232,7 +2240,7 @@
               <a:rPr lang="en-US" smtClean="0"/>
               <a:t>Click to edit Master title style</a:t>
             </a:r>
-            <a:endParaRPr lang="en-US"/>
+            <a:endParaRPr lang="en-US" dirty="0"/>
           </a:p>
         </p:txBody>
       </p:sp>
@@ -2253,7 +2261,7 @@
           <a:p>
             <a:fld id="{AE6754AF-6855-4FBF-9F06-D96142EEC6BA}" type="datetimeFigureOut">
               <a:rPr lang="en-US" smtClean="0"/>
-              <a:t>9/26/2017</a:t>
+              <a:t>9/27/2017</a:t>
             </a:fld>
             <a:endParaRPr lang="en-US"/>
           </a:p>
@@ -2304,7 +2312,7 @@
     </p:spTree>
     <p:extLst>
       <p:ext uri="{BB962C8B-B14F-4D97-AF65-F5344CB8AC3E}">
-        <p14:creationId xmlns:p14="http://schemas.microsoft.com/office/powerpoint/2010/main" val="2093087601"/>
+        <p14:creationId xmlns:p14="http://schemas.microsoft.com/office/powerpoint/2010/main" val="1902402667"/>
       </p:ext>
     </p:extLst>
   </p:cSld>
@@ -2348,7 +2356,7 @@
           <a:p>
             <a:fld id="{AE6754AF-6855-4FBF-9F06-D96142EEC6BA}" type="datetimeFigureOut">
               <a:rPr lang="en-US" smtClean="0"/>
-              <a:t>9/26/2017</a:t>
+              <a:t>9/27/2017</a:t>
             </a:fld>
             <a:endParaRPr lang="en-US"/>
           </a:p>
@@ -2399,7 +2407,7 @@
     </p:spTree>
     <p:extLst>
       <p:ext uri="{BB962C8B-B14F-4D97-AF65-F5344CB8AC3E}">
-        <p14:creationId xmlns:p14="http://schemas.microsoft.com/office/powerpoint/2010/main" val="3626541819"/>
+        <p14:creationId xmlns:p14="http://schemas.microsoft.com/office/powerpoint/2010/main" val="3526894010"/>
       </p:ext>
     </p:extLst>
   </p:cSld>
@@ -2438,8 +2446,8 @@
         </p:nvSpPr>
         <p:spPr>
           <a:xfrm>
-            <a:off x="839788" y="457200"/>
-            <a:ext cx="3932237" cy="1600200"/>
+            <a:off x="629841" y="457200"/>
+            <a:ext cx="2949178" cy="1600200"/>
           </a:xfrm>
         </p:spPr>
         <p:txBody>
@@ -2454,7 +2462,7 @@
               <a:rPr lang="en-US" smtClean="0"/>
               <a:t>Click to edit Master title style</a:t>
             </a:r>
-            <a:endParaRPr lang="en-US"/>
+            <a:endParaRPr lang="en-US" dirty="0"/>
           </a:p>
         </p:txBody>
       </p:sp>
@@ -2470,8 +2478,8 @@
         </p:nvSpPr>
         <p:spPr>
           <a:xfrm>
-            <a:off x="5183188" y="987425"/>
-            <a:ext cx="6172200" cy="4873625"/>
+            <a:off x="3887391" y="987426"/>
+            <a:ext cx="4629150" cy="4873625"/>
           </a:xfrm>
         </p:spPr>
         <p:txBody>
@@ -2539,7 +2547,7 @@
               <a:rPr lang="en-US" smtClean="0"/>
               <a:t>Fifth level</a:t>
             </a:r>
-            <a:endParaRPr lang="en-US"/>
+            <a:endParaRPr lang="en-US" dirty="0"/>
           </a:p>
         </p:txBody>
       </p:sp>
@@ -2555,8 +2563,8 @@
         </p:nvSpPr>
         <p:spPr>
           <a:xfrm>
-            <a:off x="839788" y="2057400"/>
-            <a:ext cx="3932237" cy="3811588"/>
+            <a:off x="629841" y="2057400"/>
+            <a:ext cx="2949178" cy="3811588"/>
           </a:xfrm>
         </p:spPr>
         <p:txBody>
@@ -2625,7 +2633,7 @@
           <a:p>
             <a:fld id="{AE6754AF-6855-4FBF-9F06-D96142EEC6BA}" type="datetimeFigureOut">
               <a:rPr lang="en-US" smtClean="0"/>
-              <a:t>9/26/2017</a:t>
+              <a:t>9/27/2017</a:t>
             </a:fld>
             <a:endParaRPr lang="en-US"/>
           </a:p>
@@ -2676,7 +2684,7 @@
     </p:spTree>
     <p:extLst>
       <p:ext uri="{BB962C8B-B14F-4D97-AF65-F5344CB8AC3E}">
-        <p14:creationId xmlns:p14="http://schemas.microsoft.com/office/powerpoint/2010/main" val="3011005660"/>
+        <p14:creationId xmlns:p14="http://schemas.microsoft.com/office/powerpoint/2010/main" val="3876699625"/>
       </p:ext>
     </p:extLst>
   </p:cSld>
@@ -2715,8 +2723,8 @@
         </p:nvSpPr>
         <p:spPr>
           <a:xfrm>
-            <a:off x="839788" y="457200"/>
-            <a:ext cx="3932237" cy="1600200"/>
+            <a:off x="629841" y="457200"/>
+            <a:ext cx="2949178" cy="1600200"/>
           </a:xfrm>
         </p:spPr>
         <p:txBody>
@@ -2731,7 +2739,7 @@
               <a:rPr lang="en-US" smtClean="0"/>
               <a:t>Click to edit Master title style</a:t>
             </a:r>
-            <a:endParaRPr lang="en-US"/>
+            <a:endParaRPr lang="en-US" dirty="0"/>
           </a:p>
         </p:txBody>
       </p:sp>
@@ -2739,7 +2747,7 @@
         <p:nvSpPr>
           <p:cNvPr id="3" name="Picture Placeholder 2"/>
           <p:cNvSpPr>
-            <a:spLocks noGrp="1"/>
+            <a:spLocks noGrp="1" noChangeAspect="1"/>
           </p:cNvSpPr>
           <p:nvPr>
             <p:ph type="pic" idx="1"/>
@@ -2747,12 +2755,12 @@
         </p:nvSpPr>
         <p:spPr>
           <a:xfrm>
-            <a:off x="5183188" y="987425"/>
-            <a:ext cx="6172200" cy="4873625"/>
+            <a:off x="3887391" y="987426"/>
+            <a:ext cx="4629150" cy="4873625"/>
           </a:xfrm>
         </p:spPr>
         <p:txBody>
-          <a:bodyPr/>
+          <a:bodyPr anchor="t"/>
           <a:lstStyle>
             <a:lvl1pPr marL="0" indent="0">
               <a:buNone/>
@@ -2792,7 +2800,11 @@
             </a:lvl9pPr>
           </a:lstStyle>
           <a:p>
-            <a:endParaRPr lang="en-US"/>
+            <a:r>
+              <a:rPr lang="en-US" smtClean="0"/>
+              <a:t>Click icon to add picture</a:t>
+            </a:r>
+            <a:endParaRPr lang="en-US" dirty="0"/>
           </a:p>
         </p:txBody>
       </p:sp>
@@ -2808,8 +2820,8 @@
         </p:nvSpPr>
         <p:spPr>
           <a:xfrm>
-            <a:off x="839788" y="2057400"/>
-            <a:ext cx="3932237" cy="3811588"/>
+            <a:off x="629841" y="2057400"/>
+            <a:ext cx="2949178" cy="3811588"/>
           </a:xfrm>
         </p:spPr>
         <p:txBody>
@@ -2878,7 +2890,7 @@
           <a:p>
             <a:fld id="{AE6754AF-6855-4FBF-9F06-D96142EEC6BA}" type="datetimeFigureOut">
               <a:rPr lang="en-US" smtClean="0"/>
-              <a:t>9/26/2017</a:t>
+              <a:t>9/27/2017</a:t>
             </a:fld>
             <a:endParaRPr lang="en-US"/>
           </a:p>
@@ -2929,7 +2941,7 @@
     </p:spTree>
     <p:extLst>
       <p:ext uri="{BB962C8B-B14F-4D97-AF65-F5344CB8AC3E}">
-        <p14:creationId xmlns:p14="http://schemas.microsoft.com/office/powerpoint/2010/main" val="477671507"/>
+        <p14:creationId xmlns:p14="http://schemas.microsoft.com/office/powerpoint/2010/main" val="376272936"/>
       </p:ext>
     </p:extLst>
   </p:cSld>
@@ -2950,7 +2962,7 @@
           </a:blip>
           <a:srcRect/>
           <a:stretch>
-            <a:fillRect/>
+            <a:fillRect l="-17000" r="-17000"/>
           </a:stretch>
         </a:blipFill>
         <a:effectLst/>
@@ -2982,8 +2994,8 @@
         </p:nvSpPr>
         <p:spPr>
           <a:xfrm>
-            <a:off x="838200" y="365125"/>
-            <a:ext cx="10515600" cy="1325563"/>
+            <a:off x="628650" y="365126"/>
+            <a:ext cx="7886700" cy="1325563"/>
           </a:xfrm>
           <a:prstGeom prst="rect">
             <a:avLst/>
@@ -2999,7 +3011,7 @@
               <a:rPr lang="en-US" smtClean="0"/>
               <a:t>Click to edit Master title style</a:t>
             </a:r>
-            <a:endParaRPr lang="en-US"/>
+            <a:endParaRPr lang="en-US" dirty="0"/>
           </a:p>
         </p:txBody>
       </p:sp>
@@ -3015,8 +3027,8 @@
         </p:nvSpPr>
         <p:spPr>
           <a:xfrm>
-            <a:off x="838200" y="1825625"/>
-            <a:ext cx="10515600" cy="4351338"/>
+            <a:off x="628650" y="1825625"/>
+            <a:ext cx="7886700" cy="4351338"/>
           </a:xfrm>
           <a:prstGeom prst="rect">
             <a:avLst/>
@@ -3061,7 +3073,7 @@
               <a:rPr lang="en-US" smtClean="0"/>
               <a:t>Fifth level</a:t>
             </a:r>
-            <a:endParaRPr lang="en-US"/>
+            <a:endParaRPr lang="en-US" dirty="0"/>
           </a:p>
         </p:txBody>
       </p:sp>
@@ -3077,8 +3089,8 @@
         </p:nvSpPr>
         <p:spPr>
           <a:xfrm>
-            <a:off x="838200" y="6356350"/>
-            <a:ext cx="2743200" cy="365125"/>
+            <a:off x="628650" y="6356351"/>
+            <a:ext cx="2057400" cy="365125"/>
           </a:xfrm>
           <a:prstGeom prst="rect">
             <a:avLst/>
@@ -3100,7 +3112,7 @@
           <a:p>
             <a:fld id="{AE6754AF-6855-4FBF-9F06-D96142EEC6BA}" type="datetimeFigureOut">
               <a:rPr lang="en-US" smtClean="0"/>
-              <a:t>9/26/2017</a:t>
+              <a:t>9/27/2017</a:t>
             </a:fld>
             <a:endParaRPr lang="en-US"/>
           </a:p>
@@ -3118,8 +3130,8 @@
         </p:nvSpPr>
         <p:spPr>
           <a:xfrm>
-            <a:off x="4038600" y="6356350"/>
-            <a:ext cx="4114800" cy="365125"/>
+            <a:off x="3028950" y="6356351"/>
+            <a:ext cx="3086100" cy="365125"/>
           </a:xfrm>
           <a:prstGeom prst="rect">
             <a:avLst/>
@@ -3155,8 +3167,8 @@
         </p:nvSpPr>
         <p:spPr>
           <a:xfrm>
-            <a:off x="8610600" y="6356350"/>
-            <a:ext cx="2743200" cy="365125"/>
+            <a:off x="6457950" y="6356351"/>
+            <a:ext cx="2057400" cy="365125"/>
           </a:xfrm>
           <a:prstGeom prst="rect">
             <a:avLst/>
@@ -3187,23 +3199,23 @@
     </p:spTree>
     <p:extLst>
       <p:ext uri="{BB962C8B-B14F-4D97-AF65-F5344CB8AC3E}">
-        <p14:creationId xmlns:p14="http://schemas.microsoft.com/office/powerpoint/2010/main" val="1011177205"/>
+        <p14:creationId xmlns:p14="http://schemas.microsoft.com/office/powerpoint/2010/main" val="2328354798"/>
       </p:ext>
     </p:extLst>
   </p:cSld>
   <p:clrMap bg1="lt1" tx1="dk1" bg2="lt2" tx2="dk2" accent1="accent1" accent2="accent2" accent3="accent3" accent4="accent4" accent5="accent5" accent6="accent6" hlink="hlink" folHlink="folHlink"/>
   <p:sldLayoutIdLst>
-    <p:sldLayoutId id="2147483649" r:id="rId1"/>
-    <p:sldLayoutId id="2147483650" r:id="rId2"/>
-    <p:sldLayoutId id="2147483651" r:id="rId3"/>
-    <p:sldLayoutId id="2147483652" r:id="rId4"/>
-    <p:sldLayoutId id="2147483653" r:id="rId5"/>
-    <p:sldLayoutId id="2147483654" r:id="rId6"/>
-    <p:sldLayoutId id="2147483655" r:id="rId7"/>
-    <p:sldLayoutId id="2147483656" r:id="rId8"/>
-    <p:sldLayoutId id="2147483657" r:id="rId9"/>
-    <p:sldLayoutId id="2147483658" r:id="rId10"/>
-    <p:sldLayoutId id="2147483659" r:id="rId11"/>
+    <p:sldLayoutId id="2147483661" r:id="rId1"/>
+    <p:sldLayoutId id="2147483662" r:id="rId2"/>
+    <p:sldLayoutId id="2147483663" r:id="rId3"/>
+    <p:sldLayoutId id="2147483664" r:id="rId4"/>
+    <p:sldLayoutId id="2147483665" r:id="rId5"/>
+    <p:sldLayoutId id="2147483666" r:id="rId6"/>
+    <p:sldLayoutId id="2147483667" r:id="rId7"/>
+    <p:sldLayoutId id="2147483668" r:id="rId8"/>
+    <p:sldLayoutId id="2147483669" r:id="rId9"/>
+    <p:sldLayoutId id="2147483670" r:id="rId10"/>
+    <p:sldLayoutId id="2147483671" r:id="rId11"/>
   </p:sldLayoutIdLst>
   <p:txStyles>
     <p:titleStyle>
@@ -3505,100 +3517,6 @@
           <a:chExt cx="0" cy="0"/>
         </a:xfrm>
       </p:grpSpPr>
-      <p:grpSp>
-        <p:nvGrpSpPr>
-          <p:cNvPr id="15" name="Background"/>
-          <p:cNvGrpSpPr/>
-          <p:nvPr/>
-        </p:nvGrpSpPr>
-        <p:grpSpPr>
-          <a:xfrm>
-            <a:off x="0" y="0"/>
-            <a:ext cx="12195263" cy="6858000"/>
-            <a:chOff x="0" y="0"/>
-            <a:chExt cx="12195263" cy="6858000"/>
-          </a:xfrm>
-        </p:grpSpPr>
-        <p:pic>
-          <p:nvPicPr>
-            <p:cNvPr id="10" name="Image"/>
-            <p:cNvPicPr>
-              <a:picLocks noChangeAspect="1"/>
-            </p:cNvPicPr>
-            <p:nvPr/>
-          </p:nvPicPr>
-          <p:blipFill>
-            <a:blip r:embed="rId3" cstate="print">
-              <a:extLst>
-                <a:ext uri="{28A0092B-C50C-407E-A947-70E740481C1C}">
-                  <a14:useLocalDpi xmlns:a14="http://schemas.microsoft.com/office/drawing/2010/main" val="0"/>
-                </a:ext>
-              </a:extLst>
-            </a:blip>
-            <a:stretch>
-              <a:fillRect/>
-            </a:stretch>
-          </p:blipFill>
-          <p:spPr>
-            <a:xfrm>
-              <a:off x="0" y="0"/>
-              <a:ext cx="12192000" cy="6858000"/>
-            </a:xfrm>
-            <a:prstGeom prst="rect">
-              <a:avLst/>
-            </a:prstGeom>
-            <a:noFill/>
-          </p:spPr>
-        </p:pic>
-        <p:sp>
-          <p:nvSpPr>
-            <p:cNvPr id="11" name="Overlay"/>
-            <p:cNvSpPr/>
-            <p:nvPr/>
-          </p:nvSpPr>
-          <p:spPr>
-            <a:xfrm>
-              <a:off x="0" y="0"/>
-              <a:ext cx="12195263" cy="6858000"/>
-            </a:xfrm>
-            <a:prstGeom prst="rect">
-              <a:avLst/>
-            </a:prstGeom>
-            <a:solidFill>
-              <a:srgbClr val="443E62">
-                <a:alpha val="89804"/>
-              </a:srgbClr>
-            </a:solidFill>
-            <a:ln>
-              <a:noFill/>
-            </a:ln>
-          </p:spPr>
-          <p:style>
-            <a:lnRef idx="2">
-              <a:schemeClr val="accent1">
-                <a:shade val="50000"/>
-              </a:schemeClr>
-            </a:lnRef>
-            <a:fillRef idx="1">
-              <a:schemeClr val="accent1"/>
-            </a:fillRef>
-            <a:effectRef idx="0">
-              <a:schemeClr val="accent1"/>
-            </a:effectRef>
-            <a:fontRef idx="minor">
-              <a:schemeClr val="lt1"/>
-            </a:fontRef>
-          </p:style>
-          <p:txBody>
-            <a:bodyPr rtlCol="0" anchor="ctr"/>
-            <a:lstStyle/>
-            <a:p>
-              <a:pPr algn="ctr"/>
-              <a:endParaRPr lang="en-US"/>
-            </a:p>
-          </p:txBody>
-        </p:sp>
-      </p:grpSp>
       <p:sp>
         <p:nvSpPr>
           <p:cNvPr id="2" name="Title 1"/>
@@ -3611,8 +3529,8 @@
         </p:nvSpPr>
         <p:spPr>
           <a:xfrm>
-            <a:off x="1524000" y="2422998"/>
-            <a:ext cx="9144000" cy="2387600"/>
+            <a:off x="1143000" y="2674499"/>
+            <a:ext cx="6858000" cy="1790700"/>
           </a:xfrm>
           <a:effectLst>
             <a:outerShdw blurRad="50800" dist="38100" dir="2700000" algn="tl" rotWithShape="0">
@@ -3629,7 +3547,7 @@
           <a:lstStyle/>
           <a:p>
             <a:r>
-              <a:rPr lang="en-US" sz="8000" i="1" dirty="0" smtClean="0">
+              <a:rPr lang="en-US" sz="6000" i="1" dirty="0">
                 <a:ln w="6350">
                   <a:solidFill>
                     <a:srgbClr val="88873C"/>
@@ -3644,7 +3562,7 @@
               </a:rPr>
               <a:t>dvcoders</a:t>
             </a:r>
-            <a:endParaRPr lang="en-US" sz="8000" i="1" dirty="0">
+            <a:endParaRPr lang="en-US" sz="6000" i="1" dirty="0">
               <a:ln w="6350">
                 <a:solidFill>
                   <a:srgbClr val="88873C"/>
@@ -3672,8 +3590,8 @@
         </p:nvSpPr>
         <p:spPr>
           <a:xfrm>
-            <a:off x="1524000" y="4925069"/>
-            <a:ext cx="9144000" cy="1655762"/>
+            <a:off x="1143000" y="4551052"/>
+            <a:ext cx="6858000" cy="1241822"/>
           </a:xfrm>
           <a:effectLst>
             <a:outerShdw blurRad="50800" dist="38100" dir="2700000" algn="tl" rotWithShape="0">
@@ -3698,7 +3616,7 @@
               </a:spcBef>
             </a:pPr>
             <a:r>
-              <a:rPr lang="en-US" sz="3200" dirty="0" smtClean="0">
+              <a:rPr lang="en-US" sz="2400" dirty="0">
                 <a:solidFill>
                   <a:schemeClr val="bg1"/>
                 </a:solidFill>
@@ -3719,7 +3637,7 @@
               </a:spcBef>
             </a:pPr>
             <a:r>
-              <a:rPr lang="en-US" sz="2000" dirty="0" smtClean="0">
+              <a:rPr lang="en-US" sz="1500" dirty="0">
                 <a:solidFill>
                   <a:srgbClr val="E7E7ED"/>
                 </a:solidFill>
@@ -3740,7 +3658,7 @@
               </a:spcBef>
             </a:pPr>
             <a:r>
-              <a:rPr lang="en-US" sz="2000" dirty="0" smtClean="0">
+              <a:rPr lang="en-US" sz="1500" dirty="0">
                 <a:solidFill>
                   <a:srgbClr val="E7E7ED"/>
                 </a:solidFill>
@@ -3761,8 +3679,8 @@
         </p:nvGrpSpPr>
         <p:grpSpPr>
           <a:xfrm>
-            <a:off x="4902708" y="930282"/>
-            <a:ext cx="2386584" cy="2402658"/>
+            <a:off x="3677031" y="1554961"/>
+            <a:ext cx="1789938" cy="1801994"/>
             <a:chOff x="4902708" y="1235825"/>
             <a:chExt cx="2386584" cy="2402658"/>
           </a:xfrm>
@@ -3820,7 +3738,7 @@
             <a:lstStyle/>
             <a:p>
               <a:pPr algn="ctr"/>
-              <a:endParaRPr lang="en-US"/>
+              <a:endParaRPr lang="en-US" sz="1350"/>
             </a:p>
           </p:txBody>
         </p:sp>
@@ -3833,11 +3751,11 @@
             <p:nvPr/>
           </p:nvPicPr>
           <p:blipFill>
-            <a:blip r:embed="rId4" cstate="print">
+            <a:blip r:embed="rId3" cstate="print">
               <a:extLst>
                 <a:ext uri="{BEBA8EAE-BF5A-486C-A8C5-ECC9F3942E4B}">
                   <a14:imgProps xmlns:a14="http://schemas.microsoft.com/office/drawing/2010/main">
-                    <a14:imgLayer r:embed="rId5">
+                    <a14:imgLayer r:embed="rId4">
                       <a14:imgEffect>
                         <a14:colorTemperature colorTemp="6600"/>
                       </a14:imgEffect>
@@ -3977,6 +3895,10 @@
           </p:nvPr>
         </p:nvSpPr>
         <p:spPr>
+          <a:xfrm>
+            <a:off x="628650" y="1625600"/>
+            <a:ext cx="7886700" cy="4551363"/>
+          </a:xfrm>
           <a:effectLst>
             <a:outerShdw blurRad="50800" dist="38100" dir="2700000" algn="tl" rotWithShape="0">
               <a:prstClr val="black">
@@ -3991,7 +3913,7 @@
           </a:bodyPr>
           <a:lstStyle/>
           <a:p>
-            <a:pPr marL="457200" indent="-339725">
+            <a:pPr marL="342900" indent="-254794">
               <a:lnSpc>
                 <a:spcPct val="120000"/>
               </a:lnSpc>
@@ -4000,7 +3922,7 @@
               </a:spcBef>
             </a:pPr>
             <a:r>
-              <a:rPr lang="en-US" dirty="0" smtClean="0">
+              <a:rPr lang="en-US" sz="2600" dirty="0" smtClean="0">
                 <a:solidFill>
                   <a:schemeClr val="bg1"/>
                 </a:solidFill>
@@ -4012,7 +3934,7 @@
             </a:r>
           </a:p>
           <a:p>
-            <a:pPr marL="457200" indent="-339725">
+            <a:pPr marL="342900" indent="-254794">
               <a:lnSpc>
                 <a:spcPct val="120000"/>
               </a:lnSpc>
@@ -4021,7 +3943,7 @@
               </a:spcBef>
             </a:pPr>
             <a:r>
-              <a:rPr lang="en-US" dirty="0">
+              <a:rPr lang="en-US" sz="2600" dirty="0">
                 <a:solidFill>
                   <a:schemeClr val="bg1"/>
                 </a:solidFill>
@@ -4032,7 +3954,7 @@
               <a:t>T</a:t>
             </a:r>
             <a:r>
-              <a:rPr lang="en-US" dirty="0" smtClean="0">
+              <a:rPr lang="en-US" sz="2600" dirty="0" smtClean="0">
                 <a:solidFill>
                   <a:schemeClr val="bg1"/>
                 </a:solidFill>
@@ -4043,7 +3965,7 @@
               <a:t>ags like  </a:t>
             </a:r>
             <a:r>
-              <a:rPr lang="en-US" dirty="0" smtClean="0">
+              <a:rPr lang="en-US" sz="2600" dirty="0" smtClean="0">
                 <a:solidFill>
                   <a:srgbClr val="F92672"/>
                 </a:solidFill>
@@ -4055,7 +3977,7 @@
               <a:t>&lt;</a:t>
             </a:r>
             <a:r>
-              <a:rPr lang="en-US" dirty="0">
+              <a:rPr lang="en-US" sz="2600" dirty="0">
                 <a:solidFill>
                   <a:srgbClr val="F92672"/>
                 </a:solidFill>
@@ -4067,7 +3989,7 @@
               <a:t>p&gt;</a:t>
             </a:r>
             <a:r>
-              <a:rPr lang="en-US" dirty="0" smtClean="0">
+              <a:rPr lang="en-US" sz="2600" dirty="0" smtClean="0">
                 <a:solidFill>
                   <a:schemeClr val="bg1"/>
                 </a:solidFill>
@@ -4079,7 +4001,7 @@
             </a:r>
           </a:p>
           <a:p>
-            <a:pPr marL="457200" indent="-339725">
+            <a:pPr marL="342900" indent="-254794">
               <a:lnSpc>
                 <a:spcPct val="120000"/>
               </a:lnSpc>
@@ -4088,7 +4010,7 @@
               </a:spcBef>
             </a:pPr>
             <a:r>
-              <a:rPr lang="en-US" dirty="0" smtClean="0">
+              <a:rPr lang="en-US" sz="2600" dirty="0" smtClean="0">
                 <a:solidFill>
                   <a:schemeClr val="bg1"/>
                 </a:solidFill>
@@ -4100,7 +4022,7 @@
             </a:r>
           </a:p>
           <a:p>
-            <a:pPr marL="457200" indent="-339725">
+            <a:pPr marL="342900" indent="-254794">
               <a:lnSpc>
                 <a:spcPct val="120000"/>
               </a:lnSpc>
@@ -4109,7 +4031,7 @@
               </a:spcBef>
             </a:pPr>
             <a:r>
-              <a:rPr lang="en-US" dirty="0" smtClean="0">
+              <a:rPr lang="en-US" sz="2600" dirty="0" smtClean="0">
                 <a:solidFill>
                   <a:schemeClr val="bg1"/>
                 </a:solidFill>
@@ -4117,9 +4039,31 @@
                 <a:ea typeface="Lato" panose="020F0502020204030203" pitchFamily="34" charset="0"/>
                 <a:cs typeface="Lato" panose="020F0502020204030203" pitchFamily="34" charset="0"/>
               </a:rPr>
-              <a:t>Just having the tag there shows something on the page</a:t>
-            </a:r>
-            <a:endParaRPr lang="en-US" dirty="0">
+              <a:t>Just having the tag </a:t>
+            </a:r>
+            <a:r>
+              <a:rPr lang="en-US" sz="2600" dirty="0" smtClean="0">
+                <a:solidFill>
+                  <a:schemeClr val="bg1"/>
+                </a:solidFill>
+                <a:latin typeface="Lato" panose="020F0502020204030203" pitchFamily="34" charset="0"/>
+                <a:ea typeface="Lato" panose="020F0502020204030203" pitchFamily="34" charset="0"/>
+                <a:cs typeface="Lato" panose="020F0502020204030203" pitchFamily="34" charset="0"/>
+              </a:rPr>
+              <a:t>shows </a:t>
+            </a:r>
+            <a:r>
+              <a:rPr lang="en-US" sz="2600" dirty="0" smtClean="0">
+                <a:solidFill>
+                  <a:schemeClr val="bg1"/>
+                </a:solidFill>
+                <a:latin typeface="Lato" panose="020F0502020204030203" pitchFamily="34" charset="0"/>
+                <a:ea typeface="Lato" panose="020F0502020204030203" pitchFamily="34" charset="0"/>
+                <a:cs typeface="Lato" panose="020F0502020204030203" pitchFamily="34" charset="0"/>
+              </a:rPr>
+              <a:t>something on the page</a:t>
+            </a:r>
+            <a:endParaRPr lang="en-US" sz="2600" dirty="0">
               <a:solidFill>
                 <a:schemeClr val="bg1"/>
               </a:solidFill>
@@ -4232,15 +4176,17 @@
         </p:nvSpPr>
         <p:spPr>
           <a:xfrm>
-            <a:off x="838200" y="2728610"/>
-            <a:ext cx="10515600" cy="3463592"/>
+            <a:off x="628650" y="2903708"/>
+            <a:ext cx="7886700" cy="3253252"/>
           </a:xfrm>
         </p:spPr>
         <p:txBody>
-          <a:bodyPr/>
+          <a:bodyPr>
+            <a:normAutofit/>
+          </a:bodyPr>
           <a:lstStyle/>
           <a:p>
-            <a:pPr marL="457200" indent="-339725">
+            <a:pPr marL="342900" indent="-254794">
               <a:lnSpc>
                 <a:spcPct val="120000"/>
               </a:lnSpc>
@@ -4249,7 +4195,7 @@
               </a:spcBef>
             </a:pPr>
             <a:r>
-              <a:rPr lang="en-US" dirty="0">
+              <a:rPr lang="en-US" sz="2600" dirty="0">
                 <a:solidFill>
                   <a:schemeClr val="bg1"/>
                 </a:solidFill>
@@ -4260,7 +4206,7 @@
               <a:t>No</a:t>
             </a:r>
             <a:r>
-              <a:rPr lang="en-US" dirty="0" smtClean="0">
+              <a:rPr lang="en-US" sz="2600" dirty="0" smtClean="0">
                 <a:solidFill>
                   <a:schemeClr val="bg1"/>
                 </a:solidFill>
@@ -4271,7 +4217,7 @@
               <a:t> </a:t>
             </a:r>
             <a:r>
-              <a:rPr lang="en-US" dirty="0">
+              <a:rPr lang="en-US" sz="2600" dirty="0">
                 <a:solidFill>
                   <a:schemeClr val="bg1"/>
                 </a:solidFill>
@@ -4282,7 +4228,7 @@
               <a:t>need</a:t>
             </a:r>
             <a:r>
-              <a:rPr lang="en-US" dirty="0" smtClean="0">
+              <a:rPr lang="en-US" sz="2600" dirty="0" smtClean="0">
                 <a:solidFill>
                   <a:schemeClr val="bg1"/>
                 </a:solidFill>
@@ -4293,7 +4239,7 @@
               <a:t> for a </a:t>
             </a:r>
             <a:r>
-              <a:rPr lang="en-US" dirty="0">
+              <a:rPr lang="en-US" sz="2600" dirty="0">
                 <a:solidFill>
                   <a:srgbClr val="F92672"/>
                 </a:solidFill>
@@ -4305,7 +4251,7 @@
               <a:t>&lt;/img&gt;</a:t>
             </a:r>
             <a:r>
-              <a:rPr lang="en-US" dirty="0" smtClean="0">
+              <a:rPr lang="en-US" sz="2600" dirty="0" smtClean="0">
                 <a:solidFill>
                   <a:schemeClr val="bg1"/>
                 </a:solidFill>
@@ -4316,7 +4262,7 @@
               <a:t> behind - </a:t>
             </a:r>
             <a:r>
-              <a:rPr lang="en-US" dirty="0">
+              <a:rPr lang="en-US" sz="2600" dirty="0">
                 <a:solidFill>
                   <a:schemeClr val="bg1"/>
                 </a:solidFill>
@@ -4327,7 +4273,7 @@
               <a:t>n</a:t>
             </a:r>
             <a:r>
-              <a:rPr lang="en-US" dirty="0" smtClean="0">
+              <a:rPr lang="en-US" sz="2600" dirty="0" smtClean="0">
                 <a:solidFill>
                   <a:schemeClr val="bg1"/>
                 </a:solidFill>
@@ -4335,11 +4281,30 @@
                 <a:ea typeface="Lato" panose="020F0502020204030203" pitchFamily="34" charset="0"/>
                 <a:cs typeface="Lato" panose="020F0502020204030203" pitchFamily="34" charset="0"/>
               </a:rPr>
-              <a:t>o text contained inside</a:t>
-            </a:r>
-          </a:p>
-          <a:p>
-            <a:pPr marL="457200" indent="-339725">
+              <a:t>o text </a:t>
+            </a:r>
+            <a:r>
+              <a:rPr lang="en-US" sz="2600" dirty="0" smtClean="0">
+                <a:solidFill>
+                  <a:schemeClr val="bg1"/>
+                </a:solidFill>
+                <a:latin typeface="Lato" panose="020F0502020204030203" pitchFamily="34" charset="0"/>
+                <a:ea typeface="Lato" panose="020F0502020204030203" pitchFamily="34" charset="0"/>
+                <a:cs typeface="Lato" panose="020F0502020204030203" pitchFamily="34" charset="0"/>
+              </a:rPr>
+              <a:t>inside</a:t>
+            </a:r>
+            <a:endParaRPr lang="en-US" sz="2600" dirty="0" smtClean="0">
+              <a:solidFill>
+                <a:schemeClr val="bg1"/>
+              </a:solidFill>
+              <a:latin typeface="Lato" panose="020F0502020204030203" pitchFamily="34" charset="0"/>
+              <a:ea typeface="Lato" panose="020F0502020204030203" pitchFamily="34" charset="0"/>
+              <a:cs typeface="Lato" panose="020F0502020204030203" pitchFamily="34" charset="0"/>
+            </a:endParaRPr>
+          </a:p>
+          <a:p>
+            <a:pPr marL="342900" indent="-254794">
               <a:lnSpc>
                 <a:spcPct val="120000"/>
               </a:lnSpc>
@@ -4348,7 +4313,7 @@
               </a:spcBef>
             </a:pPr>
             <a:r>
-              <a:rPr lang="en-US" dirty="0" smtClean="0">
+              <a:rPr lang="en-US" sz="2600" dirty="0">
                 <a:solidFill>
                   <a:schemeClr val="bg1"/>
                 </a:solidFill>
@@ -4356,22 +4321,10 @@
                 <a:ea typeface="Lato" panose="020F0502020204030203" pitchFamily="34" charset="0"/>
                 <a:cs typeface="Lato" panose="020F0502020204030203" pitchFamily="34" charset="0"/>
               </a:rPr>
-              <a:t>Instead, has </a:t>
-            </a:r>
-            <a:r>
-              <a:rPr lang="en-US" dirty="0" err="1">
-                <a:solidFill>
-                  <a:srgbClr val="91E22A"/>
-                </a:solidFill>
-                <a:highlight>
-                  <a:srgbClr val="293134"/>
-                </a:highlight>
-                <a:latin typeface="SF Mono" panose="020B0009000002000000" pitchFamily="49" charset="0"/>
-              </a:rPr>
-              <a:t>src</a:t>
-            </a:r>
-            <a:r>
-              <a:rPr lang="en-US" dirty="0" smtClean="0">
+              <a:t>H</a:t>
+            </a:r>
+            <a:r>
+              <a:rPr lang="en-US" sz="2600" dirty="0" smtClean="0">
                 <a:solidFill>
                   <a:schemeClr val="bg1"/>
                 </a:solidFill>
@@ -4379,11 +4332,34 @@
                 <a:ea typeface="Lato" panose="020F0502020204030203" pitchFamily="34" charset="0"/>
                 <a:cs typeface="Lato" panose="020F0502020204030203" pitchFamily="34" charset="0"/>
               </a:rPr>
+              <a:t>as </a:t>
+            </a:r>
+            <a:r>
+              <a:rPr lang="en-US" sz="2600" dirty="0" err="1">
+                <a:solidFill>
+                  <a:srgbClr val="91E22A"/>
+                </a:solidFill>
+                <a:highlight>
+                  <a:srgbClr val="293134"/>
+                </a:highlight>
+                <a:latin typeface="SF Mono" panose="020B0009000002000000" pitchFamily="49" charset="0"/>
+              </a:rPr>
+              <a:t>src</a:t>
+            </a:r>
+            <a:r>
+              <a:rPr lang="en-US" sz="2600" dirty="0" smtClean="0">
+                <a:solidFill>
+                  <a:schemeClr val="bg1"/>
+                </a:solidFill>
+                <a:latin typeface="Lato" panose="020F0502020204030203" pitchFamily="34" charset="0"/>
+                <a:ea typeface="Lato" panose="020F0502020204030203" pitchFamily="34" charset="0"/>
+                <a:cs typeface="Lato" panose="020F0502020204030203" pitchFamily="34" charset="0"/>
+              </a:rPr>
               <a:t> property specifying which image to show</a:t>
             </a:r>
           </a:p>
           <a:p>
-            <a:pPr marL="457200" indent="-339725">
+            <a:pPr marL="342900" indent="-254794">
               <a:lnSpc>
                 <a:spcPct val="120000"/>
               </a:lnSpc>
@@ -4392,7 +4368,7 @@
               </a:spcBef>
             </a:pPr>
             <a:r>
-              <a:rPr lang="en-US" dirty="0" smtClean="0">
+              <a:rPr lang="en-US" sz="2600" dirty="0" smtClean="0">
                 <a:solidFill>
                   <a:schemeClr val="bg1"/>
                 </a:solidFill>
@@ -4403,7 +4379,7 @@
               <a:t>Think of </a:t>
             </a:r>
             <a:r>
-              <a:rPr lang="en-US" dirty="0">
+              <a:rPr lang="en-US" sz="2600" dirty="0">
                 <a:solidFill>
                   <a:srgbClr val="F92672"/>
                 </a:solidFill>
@@ -4415,7 +4391,7 @@
               <a:t>&lt;/img&gt;</a:t>
             </a:r>
             <a:r>
-              <a:rPr lang="en-US" dirty="0">
+              <a:rPr lang="en-US" sz="2600" dirty="0">
                 <a:solidFill>
                   <a:schemeClr val="bg1"/>
                 </a:solidFill>
@@ -4426,7 +4402,7 @@
               <a:t> </a:t>
             </a:r>
             <a:r>
-              <a:rPr lang="en-US" dirty="0" smtClean="0">
+              <a:rPr lang="en-US" sz="2600" dirty="0" smtClean="0">
                 <a:solidFill>
                   <a:schemeClr val="bg1"/>
                 </a:solidFill>
@@ -4434,22 +4410,10 @@
                 <a:ea typeface="Lato" panose="020F0502020204030203" pitchFamily="34" charset="0"/>
                 <a:cs typeface="Lato" panose="020F0502020204030203" pitchFamily="34" charset="0"/>
               </a:rPr>
-              <a:t>as a picture fame, and </a:t>
-            </a:r>
-            <a:r>
-              <a:rPr lang="en-US" dirty="0" err="1">
-                <a:solidFill>
-                  <a:srgbClr val="91E22A"/>
-                </a:solidFill>
-                <a:highlight>
-                  <a:srgbClr val="293134"/>
-                </a:highlight>
-                <a:latin typeface="SF Mono" panose="020B0009000002000000" pitchFamily="49" charset="0"/>
-              </a:rPr>
-              <a:t>src</a:t>
-            </a:r>
-            <a:r>
-              <a:rPr lang="en-US" dirty="0" smtClean="0">
+              <a:t>as a picture </a:t>
+            </a:r>
+            <a:r>
+              <a:rPr lang="en-US" sz="2600" dirty="0" smtClean="0">
                 <a:solidFill>
                   <a:schemeClr val="bg1"/>
                 </a:solidFill>
@@ -4457,11 +4421,11 @@
                 <a:ea typeface="Lato" panose="020F0502020204030203" pitchFamily="34" charset="0"/>
                 <a:cs typeface="Lato" panose="020F0502020204030203" pitchFamily="34" charset="0"/>
               </a:rPr>
-              <a:t> is the picture you show inside</a:t>
-            </a:r>
-          </a:p>
-          <a:p>
-            <a:pPr marL="457200" indent="-339725">
+              <a:t>frame</a:t>
+            </a:r>
+          </a:p>
+          <a:p>
+            <a:pPr marL="342900" indent="-254794">
               <a:lnSpc>
                 <a:spcPct val="120000"/>
               </a:lnSpc>
@@ -4470,7 +4434,7 @@
               </a:spcBef>
             </a:pPr>
             <a:r>
-              <a:rPr lang="en-US" dirty="0" smtClean="0">
+              <a:rPr lang="en-US" sz="2600" dirty="0" smtClean="0">
                 <a:solidFill>
                   <a:schemeClr val="bg1"/>
                 </a:solidFill>
@@ -4478,21 +4442,54 @@
                 <a:ea typeface="Lato" panose="020F0502020204030203" pitchFamily="34" charset="0"/>
                 <a:cs typeface="Lato" panose="020F0502020204030203" pitchFamily="34" charset="0"/>
               </a:rPr>
-              <a:t>Enter URL or file path of image between </a:t>
-            </a:r>
-            <a:r>
-              <a:rPr lang="en-US" dirty="0">
-                <a:solidFill>
-                  <a:srgbClr val="E1E2CF"/>
-                </a:solidFill>
-                <a:highlight>
-                  <a:srgbClr val="293134"/>
-                </a:highlight>
-                <a:latin typeface="SF Mono" panose="020B0009000002000000" pitchFamily="49" charset="0"/>
-              </a:rPr>
-              <a:t>" "</a:t>
-            </a:r>
-            <a:endParaRPr lang="en-US" dirty="0">
+              <a:t>...with</a:t>
+            </a:r>
+            <a:r>
+              <a:rPr lang="en-US" sz="2600" dirty="0" smtClean="0">
+                <a:solidFill>
+                  <a:schemeClr val="bg1"/>
+                </a:solidFill>
+                <a:latin typeface="Lato" panose="020F0502020204030203" pitchFamily="34" charset="0"/>
+                <a:ea typeface="Lato" panose="020F0502020204030203" pitchFamily="34" charset="0"/>
+                <a:cs typeface="Lato" panose="020F0502020204030203" pitchFamily="34" charset="0"/>
+              </a:rPr>
+              <a:t> </a:t>
+            </a:r>
+            <a:r>
+              <a:rPr lang="en-US" sz="2600" dirty="0" err="1">
+                <a:solidFill>
+                  <a:srgbClr val="91E22A"/>
+                </a:solidFill>
+                <a:highlight>
+                  <a:srgbClr val="293134"/>
+                </a:highlight>
+                <a:latin typeface="SF Mono" panose="020B0009000002000000" pitchFamily="49" charset="0"/>
+              </a:rPr>
+              <a:t>src</a:t>
+            </a:r>
+            <a:r>
+              <a:rPr lang="en-US" sz="2600" dirty="0" smtClean="0">
+                <a:solidFill>
+                  <a:schemeClr val="bg1"/>
+                </a:solidFill>
+                <a:latin typeface="Lato" panose="020F0502020204030203" pitchFamily="34" charset="0"/>
+                <a:ea typeface="Lato" panose="020F0502020204030203" pitchFamily="34" charset="0"/>
+                <a:cs typeface="Lato" panose="020F0502020204030203" pitchFamily="34" charset="0"/>
+              </a:rPr>
+              <a:t> is the picture </a:t>
+            </a:r>
+            <a:r>
+              <a:rPr lang="en-US" sz="2600" dirty="0" smtClean="0">
+                <a:solidFill>
+                  <a:schemeClr val="bg1"/>
+                </a:solidFill>
+                <a:latin typeface="Lato" panose="020F0502020204030203" pitchFamily="34" charset="0"/>
+                <a:ea typeface="Lato" panose="020F0502020204030203" pitchFamily="34" charset="0"/>
+                <a:cs typeface="Lato" panose="020F0502020204030203" pitchFamily="34" charset="0"/>
+              </a:rPr>
+              <a:t>inside</a:t>
+            </a:r>
+            <a:endParaRPr lang="en-US" sz="2600" dirty="0" smtClean="0">
               <a:solidFill>
                 <a:schemeClr val="bg1"/>
               </a:solidFill>
@@ -4501,6 +4498,47 @@
               <a:cs typeface="Lato" panose="020F0502020204030203" pitchFamily="34" charset="0"/>
             </a:endParaRPr>
           </a:p>
+          <a:p>
+            <a:pPr marL="342900" indent="-254794">
+              <a:lnSpc>
+                <a:spcPct val="120000"/>
+              </a:lnSpc>
+              <a:spcBef>
+                <a:spcPts val="0"/>
+              </a:spcBef>
+            </a:pPr>
+            <a:r>
+              <a:rPr lang="en-US" sz="2600" dirty="0" smtClean="0">
+                <a:solidFill>
+                  <a:schemeClr val="bg1"/>
+                </a:solidFill>
+                <a:latin typeface="Lato" panose="020F0502020204030203" pitchFamily="34" charset="0"/>
+                <a:ea typeface="Lato" panose="020F0502020204030203" pitchFamily="34" charset="0"/>
+                <a:cs typeface="Lato" panose="020F0502020204030203" pitchFamily="34" charset="0"/>
+              </a:rPr>
+              <a:t>Enter URL or file path of image between </a:t>
+            </a:r>
+            <a:r>
+              <a:rPr lang="en-US" sz="2600" dirty="0">
+                <a:solidFill>
+                  <a:srgbClr val="E1E2CF"/>
+                </a:solidFill>
+                <a:highlight>
+                  <a:srgbClr val="293134"/>
+                </a:highlight>
+                <a:latin typeface="SF Mono" panose="020B0009000002000000" pitchFamily="49" charset="0"/>
+              </a:rPr>
+              <a:t>" "</a:t>
+            </a:r>
+            <a:endParaRPr lang="en-US" sz="2600" dirty="0">
+              <a:solidFill>
+                <a:schemeClr val="bg1"/>
+              </a:solidFill>
+              <a:latin typeface="Lato" panose="020F0502020204030203" pitchFamily="34" charset="0"/>
+              <a:ea typeface="Lato" panose="020F0502020204030203" pitchFamily="34" charset="0"/>
+              <a:cs typeface="Lato" panose="020F0502020204030203" pitchFamily="34" charset="0"/>
+            </a:endParaRPr>
+          </a:p>
         </p:txBody>
       </p:sp>
       <p:sp>
@@ -4511,8 +4549,8 @@
         </p:nvSpPr>
         <p:spPr>
           <a:xfrm>
-            <a:off x="838200" y="1828800"/>
-            <a:ext cx="10515600" cy="523220"/>
+            <a:off x="628650" y="1873250"/>
+            <a:ext cx="7886700" cy="492443"/>
           </a:xfrm>
           <a:prstGeom prst="roundRect">
             <a:avLst>
@@ -4559,7 +4597,7 @@
           <a:lstStyle/>
           <a:p>
             <a:r>
-              <a:rPr lang="en-US" sz="2800" dirty="0" smtClean="0">
+              <a:rPr lang="en-US" sz="2600" dirty="0">
                 <a:solidFill>
                   <a:srgbClr val="F92672"/>
                 </a:solidFill>
@@ -4571,7 +4609,7 @@
               <a:t>&lt;img </a:t>
             </a:r>
             <a:r>
-              <a:rPr lang="en-US" sz="2800" dirty="0" err="1" smtClean="0">
+              <a:rPr lang="en-US" sz="2600" dirty="0" err="1">
                 <a:solidFill>
                   <a:srgbClr val="91E22A"/>
                 </a:solidFill>
@@ -4583,7 +4621,7 @@
               <a:t>src</a:t>
             </a:r>
             <a:r>
-              <a:rPr lang="en-US" sz="2800" dirty="0" smtClean="0">
+              <a:rPr lang="en-US" sz="2600" dirty="0">
                 <a:solidFill>
                   <a:srgbClr val="E0E2E4"/>
                 </a:solidFill>
@@ -4595,7 +4633,7 @@
               <a:t> </a:t>
             </a:r>
             <a:r>
-              <a:rPr lang="en-US" sz="2800" dirty="0">
+              <a:rPr lang="en-US" sz="2600" dirty="0">
                 <a:solidFill>
                   <a:srgbClr val="E0E2E4"/>
                 </a:solidFill>
@@ -4607,7 +4645,7 @@
               <a:t>= </a:t>
             </a:r>
             <a:r>
-              <a:rPr lang="en-US" sz="2800" dirty="0" smtClean="0">
+              <a:rPr lang="en-US" sz="2600" dirty="0">
                 <a:solidFill>
                   <a:srgbClr val="E1E2CF"/>
                 </a:solidFill>
@@ -4619,7 +4657,7 @@
               <a:t>" "</a:t>
             </a:r>
             <a:r>
-              <a:rPr lang="en-US" sz="2800" dirty="0" smtClean="0">
+              <a:rPr lang="en-US" sz="2600" dirty="0">
                 <a:solidFill>
                   <a:srgbClr val="F92672"/>
                 </a:solidFill>
@@ -4630,7 +4668,7 @@
               </a:rPr>
               <a:t>&gt;</a:t>
             </a:r>
-            <a:endParaRPr lang="en-US" sz="2800" dirty="0">
+            <a:endParaRPr lang="en-US" sz="2600" dirty="0">
               <a:solidFill>
                 <a:srgbClr val="E0E2E4"/>
               </a:solidFill>
@@ -4744,15 +4782,17 @@
         </p:nvSpPr>
         <p:spPr>
           <a:xfrm>
-            <a:off x="838200" y="2728610"/>
-            <a:ext cx="10515600" cy="3463592"/>
+            <a:off x="628650" y="2903708"/>
+            <a:ext cx="7886700" cy="2597694"/>
           </a:xfrm>
         </p:spPr>
         <p:txBody>
-          <a:bodyPr/>
+          <a:bodyPr>
+            <a:normAutofit/>
+          </a:bodyPr>
           <a:lstStyle/>
           <a:p>
-            <a:pPr marL="457200" indent="-339725">
+            <a:pPr marL="342900" indent="-254794">
               <a:lnSpc>
                 <a:spcPct val="120000"/>
               </a:lnSpc>
@@ -4773,7 +4813,7 @@
             </a:r>
           </a:p>
           <a:p>
-            <a:pPr marL="457200" indent="-339725">
+            <a:pPr marL="342900" indent="-254794">
               <a:lnSpc>
                 <a:spcPct val="120000"/>
               </a:lnSpc>
@@ -4824,11 +4864,33 @@
                 <a:ea typeface="Lato" panose="020F0502020204030203" pitchFamily="34" charset="0"/>
                 <a:cs typeface="Lato" panose="020F0502020204030203" pitchFamily="34" charset="0"/>
               </a:rPr>
-              <a:t> property specifying which page to go to</a:t>
-            </a:r>
-          </a:p>
-          <a:p>
-            <a:pPr marL="457200" indent="-339725">
+              <a:t> </a:t>
+            </a:r>
+            <a:r>
+              <a:rPr lang="en-US" dirty="0" smtClean="0">
+                <a:solidFill>
+                  <a:schemeClr val="bg1"/>
+                </a:solidFill>
+                <a:latin typeface="Lato" panose="020F0502020204030203" pitchFamily="34" charset="0"/>
+                <a:ea typeface="Lato" panose="020F0502020204030203" pitchFamily="34" charset="0"/>
+                <a:cs typeface="Lato" panose="020F0502020204030203" pitchFamily="34" charset="0"/>
+              </a:rPr>
+              <a:t>specifying </a:t>
+            </a:r>
+            <a:r>
+              <a:rPr lang="en-US" dirty="0" smtClean="0">
+                <a:solidFill>
+                  <a:schemeClr val="bg1"/>
+                </a:solidFill>
+                <a:latin typeface="Lato" panose="020F0502020204030203" pitchFamily="34" charset="0"/>
+                <a:ea typeface="Lato" panose="020F0502020204030203" pitchFamily="34" charset="0"/>
+                <a:cs typeface="Lato" panose="020F0502020204030203" pitchFamily="34" charset="0"/>
+              </a:rPr>
+              <a:t>which page to go to</a:t>
+            </a:r>
+          </a:p>
+          <a:p>
+            <a:pPr marL="342900" indent="-254794">
               <a:lnSpc>
                 <a:spcPct val="120000"/>
               </a:lnSpc>
@@ -4868,7 +4930,7 @@
                 <a:ea typeface="Lato" panose="020F0502020204030203" pitchFamily="34" charset="0"/>
                 <a:cs typeface="Lato" panose="020F0502020204030203" pitchFamily="34" charset="0"/>
               </a:rPr>
-              <a:t> is the text users can </a:t>
+              <a:t> is the text </a:t>
             </a:r>
             <a:r>
               <a:rPr lang="en-US" dirty="0" smtClean="0">
@@ -4879,7 +4941,30 @@
                 <a:ea typeface="Lato" panose="020F0502020204030203" pitchFamily="34" charset="0"/>
                 <a:cs typeface="Lato" panose="020F0502020204030203" pitchFamily="34" charset="0"/>
               </a:rPr>
-              <a:t>click, has closing </a:t>
+              <a:t>click</a:t>
+            </a:r>
+            <a:r>
+              <a:rPr lang="en-US" dirty="0" smtClean="0">
+                <a:solidFill>
+                  <a:schemeClr val="bg1"/>
+                </a:solidFill>
+                <a:latin typeface="Lato" panose="020F0502020204030203" pitchFamily="34" charset="0"/>
+                <a:ea typeface="Lato" panose="020F0502020204030203" pitchFamily="34" charset="0"/>
+                <a:cs typeface="Lato" panose="020F0502020204030203" pitchFamily="34" charset="0"/>
+              </a:rPr>
+              <a:t>, has </a:t>
+            </a:r>
+            <a:r>
+              <a:rPr lang="en-US" dirty="0" smtClean="0">
+                <a:solidFill>
+                  <a:srgbClr val="F92672"/>
+                </a:solidFill>
+                <a:highlight>
+                  <a:srgbClr val="293134"/>
+                </a:highlight>
+                <a:latin typeface="SF Mono" panose="020B0009000002000000" pitchFamily="49" charset="0"/>
+              </a:rPr>
+              <a:t>&lt;/</a:t>
             </a:r>
             <a:r>
               <a:rPr lang="en-US" dirty="0">
@@ -4891,7 +4976,7 @@
                 </a:highlight>
                 <a:latin typeface="SF Mono" panose="020B0009000002000000" pitchFamily="49" charset="0"/>
               </a:rPr>
-              <a:t>&lt;/a&gt;</a:t>
+              <a:t>a&gt;</a:t>
             </a:r>
             <a:endParaRPr lang="en-US" dirty="0">
               <a:solidFill>
@@ -4912,8 +4997,8 @@
         </p:nvSpPr>
         <p:spPr>
           <a:xfrm>
-            <a:off x="838200" y="1828800"/>
-            <a:ext cx="10515600" cy="523220"/>
+            <a:off x="628650" y="1873250"/>
+            <a:ext cx="7886700" cy="492443"/>
           </a:xfrm>
           <a:prstGeom prst="roundRect">
             <a:avLst>
@@ -4960,7 +5045,7 @@
           <a:lstStyle/>
           <a:p>
             <a:r>
-              <a:rPr lang="en-US" sz="2800" dirty="0" smtClean="0">
+              <a:rPr lang="en-US" sz="2600" dirty="0">
                 <a:solidFill>
                   <a:srgbClr val="F92672"/>
                 </a:solidFill>
@@ -4972,7 +5057,7 @@
               <a:t>&lt;a </a:t>
             </a:r>
             <a:r>
-              <a:rPr lang="en-US" sz="2800" dirty="0" err="1" smtClean="0">
+              <a:rPr lang="en-US" sz="2600" dirty="0" err="1">
                 <a:solidFill>
                   <a:srgbClr val="91E22A"/>
                 </a:solidFill>
@@ -4984,7 +5069,7 @@
               <a:t>href</a:t>
             </a:r>
             <a:r>
-              <a:rPr lang="en-US" sz="2800" dirty="0" smtClean="0">
+              <a:rPr lang="en-US" sz="2600" dirty="0">
                 <a:solidFill>
                   <a:srgbClr val="E0E2E4"/>
                 </a:solidFill>
@@ -4996,7 +5081,7 @@
               <a:t> </a:t>
             </a:r>
             <a:r>
-              <a:rPr lang="en-US" sz="2800" dirty="0">
+              <a:rPr lang="en-US" sz="2600" dirty="0">
                 <a:solidFill>
                   <a:srgbClr val="E0E2E4"/>
                 </a:solidFill>
@@ -5008,7 +5093,7 @@
               <a:t>= </a:t>
             </a:r>
             <a:r>
-              <a:rPr lang="en-US" sz="2800" dirty="0" smtClean="0">
+              <a:rPr lang="en-US" sz="2600" dirty="0">
                 <a:solidFill>
                   <a:srgbClr val="E1E2CF"/>
                 </a:solidFill>
@@ -5017,22 +5102,10 @@
                 </a:highlight>
                 <a:latin typeface="SF Mono" panose="020B0009000002000000" pitchFamily="49" charset="0"/>
               </a:rPr>
-              <a:t>" </a:t>
-            </a:r>
-            <a:r>
-              <a:rPr lang="en-US" sz="2800" dirty="0" smtClean="0">
-                <a:solidFill>
-                  <a:srgbClr val="E1E2CF"/>
-                </a:solidFill>
-                <a:highlight>
-                  <a:srgbClr val="293134"/>
-                </a:highlight>
-                <a:latin typeface="SF Mono" panose="020B0009000002000000" pitchFamily="49" charset="0"/>
-              </a:rPr>
-              <a:t>"</a:t>
-            </a:r>
-            <a:r>
-              <a:rPr lang="en-US" sz="2800" dirty="0" smtClean="0">
+              <a:t>" "</a:t>
+            </a:r>
+            <a:r>
+              <a:rPr lang="en-US" sz="2600" dirty="0">
                 <a:solidFill>
                   <a:srgbClr val="F92672"/>
                 </a:solidFill>
@@ -5041,21 +5114,9 @@
                 </a:highlight>
                 <a:latin typeface="SF Mono" panose="020B0009000002000000" pitchFamily="49" charset="0"/>
               </a:rPr>
-              <a:t>&gt;&lt;/a</a:t>
-            </a:r>
-            <a:r>
-              <a:rPr lang="en-US" sz="2800" dirty="0" smtClean="0">
-                <a:solidFill>
-                  <a:srgbClr val="F92672"/>
-                </a:solidFill>
-                <a:highlight>
-                  <a:srgbClr val="293134"/>
-                </a:highlight>
-                <a:latin typeface="SF Mono" panose="020B0009000002000000" pitchFamily="49" charset="0"/>
-              </a:rPr>
-              <a:t>&gt;</a:t>
-            </a:r>
-            <a:endParaRPr lang="en-US" sz="2800" dirty="0">
+              <a:t>&gt;&lt;/a&gt;</a:t>
+            </a:r>
+            <a:endParaRPr lang="en-US" sz="2600" dirty="0">
               <a:solidFill>
                 <a:srgbClr val="E0E2E4"/>
               </a:solidFill>
@@ -5193,8 +5254,8 @@
         </p:nvSpPr>
         <p:spPr>
           <a:xfrm>
-            <a:off x="838200" y="4285033"/>
-            <a:ext cx="10515600" cy="1891929"/>
+            <a:off x="628650" y="4071025"/>
+            <a:ext cx="7886700" cy="1418947"/>
           </a:xfrm>
           <a:effectLst>
             <a:outerShdw blurRad="50800" dist="38100" dir="2700000" algn="tl" rotWithShape="0">
@@ -5206,11 +5267,11 @@
         </p:spPr>
         <p:txBody>
           <a:bodyPr>
-            <a:normAutofit/>
+            <a:normAutofit fontScale="92500" lnSpcReduction="10000"/>
           </a:bodyPr>
           <a:lstStyle/>
           <a:p>
-            <a:pPr marL="457200" indent="-339725">
+            <a:pPr marL="342900" indent="-254794">
               <a:lnSpc>
                 <a:spcPct val="120000"/>
               </a:lnSpc>
@@ -5277,7 +5338,7 @@
             </a:r>
           </a:p>
           <a:p>
-            <a:pPr marL="457200" indent="-339725">
+            <a:pPr marL="342900" indent="-254794">
               <a:lnSpc>
                 <a:spcPct val="120000"/>
               </a:lnSpc>
@@ -5385,8 +5446,8 @@
         </p:nvSpPr>
         <p:spPr>
           <a:xfrm>
-            <a:off x="838200" y="1650116"/>
-            <a:ext cx="10515600" cy="2246769"/>
+            <a:off x="628650" y="1690689"/>
+            <a:ext cx="7886700" cy="2092881"/>
           </a:xfrm>
           <a:prstGeom prst="roundRect">
             <a:avLst>
@@ -5433,7 +5494,7 @@
           <a:lstStyle/>
           <a:p>
             <a:r>
-              <a:rPr lang="en-US" sz="2800" dirty="0">
+              <a:rPr lang="en-US" sz="2600" dirty="0">
                 <a:solidFill>
                   <a:srgbClr val="F92672"/>
                 </a:solidFill>
@@ -5444,7 +5505,7 @@
               </a:rPr>
               <a:t>&lt;ul&gt;</a:t>
             </a:r>
-            <a:endParaRPr lang="en-US" sz="2800" dirty="0">
+            <a:endParaRPr lang="en-US" sz="2600" dirty="0">
               <a:solidFill>
                 <a:srgbClr val="E0E2E4"/>
               </a:solidFill>
@@ -5456,7 +5517,7 @@
           </a:p>
           <a:p>
             <a:r>
-              <a:rPr lang="en-US" sz="2800" dirty="0">
+              <a:rPr lang="en-US" sz="2600" dirty="0">
                 <a:solidFill>
                   <a:srgbClr val="E0E2E4"/>
                 </a:solidFill>
@@ -5468,7 +5529,7 @@
               <a:t>	</a:t>
             </a:r>
             <a:r>
-              <a:rPr lang="en-US" sz="2800" dirty="0" smtClean="0">
+              <a:rPr lang="en-US" sz="2600" dirty="0">
                 <a:solidFill>
                   <a:srgbClr val="F92672"/>
                 </a:solidFill>
@@ -5480,7 +5541,7 @@
               <a:t>&lt;</a:t>
             </a:r>
             <a:r>
-              <a:rPr lang="en-US" sz="2800" dirty="0">
+              <a:rPr lang="en-US" sz="2600" dirty="0">
                 <a:solidFill>
                   <a:srgbClr val="F92672"/>
                 </a:solidFill>
@@ -5492,7 +5553,7 @@
               <a:t>li&gt;</a:t>
             </a:r>
             <a:r>
-              <a:rPr lang="en-US" sz="2800" dirty="0">
+              <a:rPr lang="en-US" sz="2600" dirty="0">
                 <a:solidFill>
                   <a:srgbClr val="E0E2E4"/>
                 </a:solidFill>
@@ -5504,7 +5565,7 @@
               <a:t>Bullet </a:t>
             </a:r>
             <a:r>
-              <a:rPr lang="en-US" sz="2800" dirty="0" smtClean="0">
+              <a:rPr lang="en-US" sz="2600" dirty="0">
                 <a:solidFill>
                   <a:srgbClr val="E0E2E4"/>
                 </a:solidFill>
@@ -5516,7 +5577,7 @@
               <a:t>point one</a:t>
             </a:r>
             <a:r>
-              <a:rPr lang="en-US" sz="2800" dirty="0">
+              <a:rPr lang="en-US" sz="2600" dirty="0">
                 <a:solidFill>
                   <a:srgbClr val="F92672"/>
                 </a:solidFill>
@@ -5527,7 +5588,7 @@
               </a:rPr>
               <a:t>&lt;/li&gt;</a:t>
             </a:r>
-            <a:endParaRPr lang="en-US" sz="2800" dirty="0">
+            <a:endParaRPr lang="en-US" sz="2600" dirty="0">
               <a:solidFill>
                 <a:srgbClr val="E0E2E4"/>
               </a:solidFill>
@@ -5539,7 +5600,7 @@
           </a:p>
           <a:p>
             <a:r>
-              <a:rPr lang="en-US" sz="2800" dirty="0">
+              <a:rPr lang="en-US" sz="2600" dirty="0">
                 <a:solidFill>
                   <a:srgbClr val="E0E2E4"/>
                 </a:solidFill>
@@ -5551,7 +5612,7 @@
               <a:t>	</a:t>
             </a:r>
             <a:r>
-              <a:rPr lang="en-US" sz="2800" dirty="0" smtClean="0">
+              <a:rPr lang="en-US" sz="2600" dirty="0">
                 <a:solidFill>
                   <a:srgbClr val="F92672"/>
                 </a:solidFill>
@@ -5563,7 +5624,7 @@
               <a:t>&lt;</a:t>
             </a:r>
             <a:r>
-              <a:rPr lang="en-US" sz="2800" dirty="0">
+              <a:rPr lang="en-US" sz="2600" dirty="0">
                 <a:solidFill>
                   <a:srgbClr val="F92672"/>
                 </a:solidFill>
@@ -5575,7 +5636,7 @@
               <a:t>li&gt;</a:t>
             </a:r>
             <a:r>
-              <a:rPr lang="en-US" sz="2800" dirty="0">
+              <a:rPr lang="en-US" sz="2600" dirty="0">
                 <a:solidFill>
                   <a:srgbClr val="E0E2E4"/>
                 </a:solidFill>
@@ -5587,7 +5648,7 @@
               <a:t>Bullet point </a:t>
             </a:r>
             <a:r>
-              <a:rPr lang="en-US" sz="2800" dirty="0" smtClean="0">
+              <a:rPr lang="en-US" sz="2600" dirty="0">
                 <a:solidFill>
                   <a:srgbClr val="E0E2E4"/>
                 </a:solidFill>
@@ -5599,7 +5660,7 @@
               <a:t>two</a:t>
             </a:r>
             <a:r>
-              <a:rPr lang="en-US" sz="2800" dirty="0">
+              <a:rPr lang="en-US" sz="2600" dirty="0">
                 <a:solidFill>
                   <a:srgbClr val="F92672"/>
                 </a:solidFill>
@@ -5610,7 +5671,7 @@
               </a:rPr>
               <a:t>&lt;/li&gt;</a:t>
             </a:r>
-            <a:endParaRPr lang="en-US" sz="2800" dirty="0">
+            <a:endParaRPr lang="en-US" sz="2600" dirty="0">
               <a:solidFill>
                 <a:srgbClr val="E0E2E4"/>
               </a:solidFill>
@@ -5622,7 +5683,7 @@
           </a:p>
           <a:p>
             <a:r>
-              <a:rPr lang="en-US" sz="2800" dirty="0">
+              <a:rPr lang="en-US" sz="2600" dirty="0">
                 <a:solidFill>
                   <a:srgbClr val="E0E2E4"/>
                 </a:solidFill>
@@ -5634,7 +5695,7 @@
               <a:t>	</a:t>
             </a:r>
             <a:r>
-              <a:rPr lang="en-US" sz="2800" dirty="0" smtClean="0">
+              <a:rPr lang="en-US" sz="2600" dirty="0">
                 <a:solidFill>
                   <a:srgbClr val="F92672"/>
                 </a:solidFill>
@@ -5646,7 +5707,7 @@
               <a:t>&lt;</a:t>
             </a:r>
             <a:r>
-              <a:rPr lang="en-US" sz="2800" dirty="0">
+              <a:rPr lang="en-US" sz="2600" dirty="0">
                 <a:solidFill>
                   <a:srgbClr val="F92672"/>
                 </a:solidFill>
@@ -5658,7 +5719,7 @@
               <a:t>li&gt;</a:t>
             </a:r>
             <a:r>
-              <a:rPr lang="en-US" sz="2800" dirty="0">
+              <a:rPr lang="en-US" sz="2600" dirty="0">
                 <a:solidFill>
                   <a:srgbClr val="E0E2E4"/>
                 </a:solidFill>
@@ -5670,7 +5731,7 @@
               <a:t>Bullet point </a:t>
             </a:r>
             <a:r>
-              <a:rPr lang="en-US" sz="2800" dirty="0" smtClean="0">
+              <a:rPr lang="en-US" sz="2600" dirty="0">
                 <a:solidFill>
                   <a:srgbClr val="E0E2E4"/>
                 </a:solidFill>
@@ -5682,7 +5743,7 @@
               <a:t>three</a:t>
             </a:r>
             <a:r>
-              <a:rPr lang="en-US" sz="2800" dirty="0">
+              <a:rPr lang="en-US" sz="2600" dirty="0">
                 <a:solidFill>
                   <a:srgbClr val="F92672"/>
                 </a:solidFill>
@@ -5693,7 +5754,7 @@
               </a:rPr>
               <a:t>&lt;/li&gt;</a:t>
             </a:r>
-            <a:endParaRPr lang="en-US" sz="2800" dirty="0">
+            <a:endParaRPr lang="en-US" sz="2600" dirty="0">
               <a:solidFill>
                 <a:srgbClr val="E0E2E4"/>
               </a:solidFill>
@@ -5705,7 +5766,7 @@
           </a:p>
           <a:p>
             <a:r>
-              <a:rPr lang="en-US" sz="2800" dirty="0" smtClean="0">
+              <a:rPr lang="en-US" sz="2600" dirty="0">
                 <a:solidFill>
                   <a:srgbClr val="F92672"/>
                 </a:solidFill>
@@ -5717,7 +5778,7 @@
               <a:t>&lt;/</a:t>
             </a:r>
             <a:r>
-              <a:rPr lang="en-US" sz="2800" dirty="0">
+              <a:rPr lang="en-US" sz="2600" dirty="0">
                 <a:solidFill>
                   <a:srgbClr val="F92672"/>
                 </a:solidFill>
@@ -5728,7 +5789,7 @@
               </a:rPr>
               <a:t>ul&gt;</a:t>
             </a:r>
-            <a:endParaRPr lang="en-US" sz="2800" dirty="0">
+            <a:endParaRPr lang="en-US" sz="2600" dirty="0">
               <a:solidFill>
                 <a:srgbClr val="E0E2E4"/>
               </a:solidFill>
@@ -5870,8 +5931,8 @@
         </p:nvSpPr>
         <p:spPr>
           <a:xfrm>
-            <a:off x="838200" y="1650116"/>
-            <a:ext cx="10515600" cy="4401205"/>
+            <a:off x="628650" y="1830678"/>
+            <a:ext cx="7886700" cy="4093428"/>
           </a:xfrm>
           <a:prstGeom prst="roundRect">
             <a:avLst>
@@ -5918,7 +5979,7 @@
           <a:lstStyle/>
           <a:p>
             <a:r>
-              <a:rPr lang="en-US" sz="2800" dirty="0">
+              <a:rPr lang="en-US" sz="2600" dirty="0">
                 <a:solidFill>
                   <a:srgbClr val="F92672"/>
                 </a:solidFill>
@@ -5929,7 +5990,7 @@
               </a:rPr>
               <a:t>&lt;table&gt;</a:t>
             </a:r>
-            <a:endParaRPr lang="en-US" sz="2800" dirty="0">
+            <a:endParaRPr lang="en-US" sz="2600" dirty="0">
               <a:solidFill>
                 <a:srgbClr val="E0E2E4"/>
               </a:solidFill>
@@ -5941,7 +6002,7 @@
           </a:p>
           <a:p>
             <a:r>
-              <a:rPr lang="en-US" sz="2800" dirty="0">
+              <a:rPr lang="en-US" sz="2600" dirty="0">
                 <a:solidFill>
                   <a:srgbClr val="E0E2E4"/>
                 </a:solidFill>
@@ -5953,7 +6014,7 @@
               <a:t>	</a:t>
             </a:r>
             <a:r>
-              <a:rPr lang="en-US" sz="2800" dirty="0">
+              <a:rPr lang="en-US" sz="2600" dirty="0">
                 <a:solidFill>
                   <a:srgbClr val="F92672"/>
                 </a:solidFill>
@@ -5965,7 +6026,7 @@
               <a:t>&lt;</a:t>
             </a:r>
             <a:r>
-              <a:rPr lang="en-US" sz="2800" dirty="0" err="1">
+              <a:rPr lang="en-US" sz="2600" dirty="0" err="1">
                 <a:solidFill>
                   <a:srgbClr val="F92672"/>
                 </a:solidFill>
@@ -5977,7 +6038,7 @@
               <a:t>tr</a:t>
             </a:r>
             <a:r>
-              <a:rPr lang="en-US" sz="2800" dirty="0">
+              <a:rPr lang="en-US" sz="2600" dirty="0">
                 <a:solidFill>
                   <a:srgbClr val="F92672"/>
                 </a:solidFill>
@@ -5989,7 +6050,7 @@
               <a:t>&gt;</a:t>
             </a:r>
             <a:r>
-              <a:rPr lang="en-US" sz="2800" dirty="0">
+              <a:rPr lang="en-US" sz="2600" dirty="0">
                 <a:solidFill>
                   <a:srgbClr val="E0E2E4"/>
                 </a:solidFill>
@@ -6001,7 +6062,7 @@
               <a:t> </a:t>
             </a:r>
             <a:r>
-              <a:rPr lang="en-US" sz="2800" dirty="0">
+              <a:rPr lang="en-US" sz="2600" dirty="0">
                 <a:solidFill>
                   <a:srgbClr val="66747B"/>
                 </a:solidFill>
@@ -6012,7 +6073,7 @@
               </a:rPr>
               <a:t>&lt;!-- Row 1 --&gt;</a:t>
             </a:r>
-            <a:endParaRPr lang="en-US" sz="2800" dirty="0">
+            <a:endParaRPr lang="en-US" sz="2600" dirty="0">
               <a:solidFill>
                 <a:srgbClr val="E0E2E4"/>
               </a:solidFill>
@@ -6024,7 +6085,7 @@
           </a:p>
           <a:p>
             <a:r>
-              <a:rPr lang="en-US" sz="2800" dirty="0">
+              <a:rPr lang="en-US" sz="2600" dirty="0">
                 <a:solidFill>
                   <a:srgbClr val="E0E2E4"/>
                 </a:solidFill>
@@ -6036,7 +6097,7 @@
               <a:t>		</a:t>
             </a:r>
             <a:r>
-              <a:rPr lang="en-US" sz="2800" dirty="0">
+              <a:rPr lang="en-US" sz="2600" dirty="0">
                 <a:solidFill>
                   <a:srgbClr val="F92672"/>
                 </a:solidFill>
@@ -6048,7 +6109,7 @@
               <a:t>&lt;td&gt;</a:t>
             </a:r>
             <a:r>
-              <a:rPr lang="en-US" sz="2800" dirty="0">
+              <a:rPr lang="en-US" sz="2600" dirty="0">
                 <a:solidFill>
                   <a:srgbClr val="E0E2E4"/>
                 </a:solidFill>
@@ -6060,7 +6121,7 @@
               <a:t>Cell 1</a:t>
             </a:r>
             <a:r>
-              <a:rPr lang="en-US" sz="2800" dirty="0">
+              <a:rPr lang="en-US" sz="2600" dirty="0">
                 <a:solidFill>
                   <a:srgbClr val="F92672"/>
                 </a:solidFill>
@@ -6071,7 +6132,7 @@
               </a:rPr>
               <a:t>&lt;/td&gt;</a:t>
             </a:r>
-            <a:endParaRPr lang="en-US" sz="2800" dirty="0">
+            <a:endParaRPr lang="en-US" sz="2600" dirty="0">
               <a:solidFill>
                 <a:srgbClr val="E0E2E4"/>
               </a:solidFill>
@@ -6083,7 +6144,7 @@
           </a:p>
           <a:p>
             <a:r>
-              <a:rPr lang="en-US" sz="2800" dirty="0">
+              <a:rPr lang="en-US" sz="2600" dirty="0">
                 <a:solidFill>
                   <a:srgbClr val="E0E2E4"/>
                 </a:solidFill>
@@ -6095,7 +6156,7 @@
               <a:t>		</a:t>
             </a:r>
             <a:r>
-              <a:rPr lang="en-US" sz="2800" dirty="0">
+              <a:rPr lang="en-US" sz="2600" dirty="0">
                 <a:solidFill>
                   <a:srgbClr val="F92672"/>
                 </a:solidFill>
@@ -6107,7 +6168,7 @@
               <a:t>&lt;td&gt;</a:t>
             </a:r>
             <a:r>
-              <a:rPr lang="en-US" sz="2800" dirty="0">
+              <a:rPr lang="en-US" sz="2600" dirty="0">
                 <a:solidFill>
                   <a:srgbClr val="E0E2E4"/>
                 </a:solidFill>
@@ -6119,7 +6180,7 @@
               <a:t>Cell 2</a:t>
             </a:r>
             <a:r>
-              <a:rPr lang="en-US" sz="2800" dirty="0">
+              <a:rPr lang="en-US" sz="2600" dirty="0">
                 <a:solidFill>
                   <a:srgbClr val="F92672"/>
                 </a:solidFill>
@@ -6131,7 +6192,7 @@
               <a:t>&lt;/td</a:t>
             </a:r>
             <a:r>
-              <a:rPr lang="en-US" sz="2800" dirty="0" smtClean="0">
+              <a:rPr lang="en-US" sz="2600" dirty="0">
                 <a:solidFill>
                   <a:srgbClr val="F92672"/>
                 </a:solidFill>
@@ -6145,7 +6206,7 @@
           </a:p>
           <a:p>
             <a:r>
-              <a:rPr lang="en-US" sz="2800" dirty="0">
+              <a:rPr lang="en-US" sz="2600" dirty="0">
                 <a:solidFill>
                   <a:srgbClr val="E0E2E4"/>
                 </a:solidFill>
@@ -6157,7 +6218,7 @@
               <a:t>	</a:t>
             </a:r>
             <a:r>
-              <a:rPr lang="en-US" sz="2800" dirty="0">
+              <a:rPr lang="en-US" sz="2600" dirty="0">
                 <a:solidFill>
                   <a:srgbClr val="F92672"/>
                 </a:solidFill>
@@ -6169,7 +6230,7 @@
               <a:t>&lt;/</a:t>
             </a:r>
             <a:r>
-              <a:rPr lang="en-US" sz="2800" dirty="0" err="1">
+              <a:rPr lang="en-US" sz="2600" dirty="0" err="1">
                 <a:solidFill>
                   <a:srgbClr val="F92672"/>
                 </a:solidFill>
@@ -6181,7 +6242,7 @@
               <a:t>tr</a:t>
             </a:r>
             <a:r>
-              <a:rPr lang="en-US" sz="2800" dirty="0">
+              <a:rPr lang="en-US" sz="2600" dirty="0">
                 <a:solidFill>
                   <a:srgbClr val="F92672"/>
                 </a:solidFill>
@@ -6192,7 +6253,7 @@
               </a:rPr>
               <a:t>&gt;</a:t>
             </a:r>
-            <a:endParaRPr lang="en-US" sz="2800" dirty="0">
+            <a:endParaRPr lang="en-US" sz="2600" dirty="0">
               <a:solidFill>
                 <a:srgbClr val="E0E2E4"/>
               </a:solidFill>
@@ -6204,7 +6265,7 @@
           </a:p>
           <a:p>
             <a:r>
-              <a:rPr lang="en-US" sz="2800" dirty="0">
+              <a:rPr lang="en-US" sz="2600" dirty="0">
                 <a:solidFill>
                   <a:srgbClr val="E0E2E4"/>
                 </a:solidFill>
@@ -6216,7 +6277,7 @@
               <a:t>	</a:t>
             </a:r>
             <a:r>
-              <a:rPr lang="en-US" sz="2800" dirty="0">
+              <a:rPr lang="en-US" sz="2600" dirty="0">
                 <a:solidFill>
                   <a:srgbClr val="F92672"/>
                 </a:solidFill>
@@ -6228,7 +6289,7 @@
               <a:t>&lt;</a:t>
             </a:r>
             <a:r>
-              <a:rPr lang="en-US" sz="2800" dirty="0" err="1">
+              <a:rPr lang="en-US" sz="2600" dirty="0" err="1">
                 <a:solidFill>
                   <a:srgbClr val="F92672"/>
                 </a:solidFill>
@@ -6240,7 +6301,7 @@
               <a:t>tr</a:t>
             </a:r>
             <a:r>
-              <a:rPr lang="en-US" sz="2800" dirty="0">
+              <a:rPr lang="en-US" sz="2600" dirty="0">
                 <a:solidFill>
                   <a:srgbClr val="F92672"/>
                 </a:solidFill>
@@ -6252,7 +6313,7 @@
               <a:t>&gt;</a:t>
             </a:r>
             <a:r>
-              <a:rPr lang="en-US" sz="2800" dirty="0">
+              <a:rPr lang="en-US" sz="2600" dirty="0">
                 <a:solidFill>
                   <a:srgbClr val="E0E2E4"/>
                 </a:solidFill>
@@ -6264,7 +6325,7 @@
               <a:t> </a:t>
             </a:r>
             <a:r>
-              <a:rPr lang="en-US" sz="2800" dirty="0">
+              <a:rPr lang="en-US" sz="2600" dirty="0">
                 <a:solidFill>
                   <a:srgbClr val="66747B"/>
                 </a:solidFill>
@@ -6275,7 +6336,7 @@
               </a:rPr>
               <a:t>&lt;!-- Row 2 --&gt;</a:t>
             </a:r>
-            <a:endParaRPr lang="en-US" sz="2800" dirty="0">
+            <a:endParaRPr lang="en-US" sz="2600" dirty="0">
               <a:solidFill>
                 <a:srgbClr val="E0E2E4"/>
               </a:solidFill>
@@ -6287,7 +6348,7 @@
           </a:p>
           <a:p>
             <a:r>
-              <a:rPr lang="en-US" sz="2800" dirty="0">
+              <a:rPr lang="en-US" sz="2600" dirty="0">
                 <a:solidFill>
                   <a:srgbClr val="E0E2E4"/>
                 </a:solidFill>
@@ -6299,7 +6360,7 @@
               <a:t>		</a:t>
             </a:r>
             <a:r>
-              <a:rPr lang="en-US" sz="2800" dirty="0">
+              <a:rPr lang="en-US" sz="2600" dirty="0">
                 <a:solidFill>
                   <a:srgbClr val="F92672"/>
                 </a:solidFill>
@@ -6311,7 +6372,7 @@
               <a:t>&lt;td&gt;</a:t>
             </a:r>
             <a:r>
-              <a:rPr lang="en-US" sz="2800" dirty="0">
+              <a:rPr lang="en-US" sz="2600" dirty="0">
                 <a:solidFill>
                   <a:srgbClr val="E0E2E4"/>
                 </a:solidFill>
@@ -6323,7 +6384,7 @@
               <a:t>Cell 1</a:t>
             </a:r>
             <a:r>
-              <a:rPr lang="en-US" sz="2800" dirty="0">
+              <a:rPr lang="en-US" sz="2600" dirty="0">
                 <a:solidFill>
                   <a:srgbClr val="F92672"/>
                 </a:solidFill>
@@ -6335,7 +6396,7 @@
               <a:t>&lt;/td</a:t>
             </a:r>
             <a:r>
-              <a:rPr lang="en-US" sz="2800" dirty="0" smtClean="0">
+              <a:rPr lang="en-US" sz="2600" dirty="0">
                 <a:solidFill>
                   <a:srgbClr val="F92672"/>
                 </a:solidFill>
@@ -6346,7 +6407,7 @@
               </a:rPr>
               <a:t>&gt;</a:t>
             </a:r>
-            <a:endParaRPr lang="en-US" sz="2800" dirty="0" smtClean="0">
+            <a:endParaRPr lang="en-US" sz="2600" dirty="0">
               <a:solidFill>
                 <a:srgbClr val="E0E2E4"/>
               </a:solidFill>
@@ -6358,7 +6419,7 @@
           </a:p>
           <a:p>
             <a:r>
-              <a:rPr lang="en-US" sz="2800" dirty="0" smtClean="0">
+              <a:rPr lang="en-US" sz="2600" dirty="0">
                 <a:solidFill>
                   <a:srgbClr val="E0E2E4"/>
                 </a:solidFill>
@@ -6370,7 +6431,7 @@
               <a:t>		</a:t>
             </a:r>
             <a:r>
-              <a:rPr lang="en-US" sz="2800" dirty="0" smtClean="0">
+              <a:rPr lang="en-US" sz="2600" dirty="0">
                 <a:solidFill>
                   <a:srgbClr val="F92672"/>
                 </a:solidFill>
@@ -6382,7 +6443,7 @@
               <a:t>&lt;td&gt;</a:t>
             </a:r>
             <a:r>
-              <a:rPr lang="en-US" sz="2800" dirty="0" smtClean="0">
+              <a:rPr lang="en-US" sz="2600" dirty="0">
                 <a:solidFill>
                   <a:srgbClr val="E0E2E4"/>
                 </a:solidFill>
@@ -6394,7 +6455,7 @@
               <a:t>Cell 2</a:t>
             </a:r>
             <a:r>
-              <a:rPr lang="en-US" sz="2800" dirty="0" smtClean="0">
+              <a:rPr lang="en-US" sz="2600" dirty="0">
                 <a:solidFill>
                   <a:srgbClr val="F92672"/>
                 </a:solidFill>
@@ -6408,7 +6469,7 @@
           </a:p>
           <a:p>
             <a:r>
-              <a:rPr lang="en-US" sz="2800" dirty="0" smtClean="0">
+              <a:rPr lang="en-US" sz="2600" dirty="0">
                 <a:solidFill>
                   <a:srgbClr val="E0E2E4"/>
                 </a:solidFill>
@@ -6420,7 +6481,7 @@
               <a:t>	</a:t>
             </a:r>
             <a:r>
-              <a:rPr lang="en-US" sz="2800" dirty="0" smtClean="0">
+              <a:rPr lang="en-US" sz="2600" dirty="0">
                 <a:solidFill>
                   <a:srgbClr val="F92672"/>
                 </a:solidFill>
@@ -6432,7 +6493,7 @@
               <a:t>&lt;/</a:t>
             </a:r>
             <a:r>
-              <a:rPr lang="en-US" sz="2800" dirty="0" err="1" smtClean="0">
+              <a:rPr lang="en-US" sz="2600" dirty="0" err="1">
                 <a:solidFill>
                   <a:srgbClr val="F92672"/>
                 </a:solidFill>
@@ -6444,7 +6505,7 @@
               <a:t>tr</a:t>
             </a:r>
             <a:r>
-              <a:rPr lang="en-US" sz="2800" dirty="0" smtClean="0">
+              <a:rPr lang="en-US" sz="2600" dirty="0">
                 <a:solidFill>
                   <a:srgbClr val="F92672"/>
                 </a:solidFill>
@@ -6455,7 +6516,7 @@
               </a:rPr>
               <a:t>&gt;</a:t>
             </a:r>
-            <a:endParaRPr lang="en-US" sz="2800" dirty="0" smtClean="0">
+            <a:endParaRPr lang="en-US" sz="2600" dirty="0">
               <a:solidFill>
                 <a:srgbClr val="E0E2E4"/>
               </a:solidFill>
@@ -6467,7 +6528,7 @@
           </a:p>
           <a:p>
             <a:r>
-              <a:rPr lang="en-US" sz="2800" dirty="0" smtClean="0">
+              <a:rPr lang="en-US" sz="2600" dirty="0">
                 <a:solidFill>
                   <a:srgbClr val="F92672"/>
                 </a:solidFill>
@@ -6479,7 +6540,7 @@
               <a:t>&lt;/</a:t>
             </a:r>
             <a:r>
-              <a:rPr lang="en-US" sz="2800" dirty="0">
+              <a:rPr lang="en-US" sz="2600" dirty="0">
                 <a:solidFill>
                   <a:srgbClr val="F92672"/>
                 </a:solidFill>
@@ -6490,7 +6551,7 @@
               </a:rPr>
               <a:t>table&gt;</a:t>
             </a:r>
-            <a:endParaRPr lang="en-US" sz="2800" dirty="0">
+            <a:endParaRPr lang="en-US" sz="2600" dirty="0">
               <a:solidFill>
                 <a:srgbClr val="E0E2E4"/>
               </a:solidFill>
@@ -6555,100 +6616,6 @@
           <a:chExt cx="0" cy="0"/>
         </a:xfrm>
       </p:grpSpPr>
-      <p:grpSp>
-        <p:nvGrpSpPr>
-          <p:cNvPr id="15" name="Background"/>
-          <p:cNvGrpSpPr/>
-          <p:nvPr/>
-        </p:nvGrpSpPr>
-        <p:grpSpPr>
-          <a:xfrm>
-            <a:off x="0" y="0"/>
-            <a:ext cx="12195263" cy="6858000"/>
-            <a:chOff x="0" y="0"/>
-            <a:chExt cx="12195263" cy="6858000"/>
-          </a:xfrm>
-        </p:grpSpPr>
-        <p:pic>
-          <p:nvPicPr>
-            <p:cNvPr id="10" name="Image"/>
-            <p:cNvPicPr>
-              <a:picLocks noChangeAspect="1"/>
-            </p:cNvPicPr>
-            <p:nvPr/>
-          </p:nvPicPr>
-          <p:blipFill>
-            <a:blip r:embed="rId3" cstate="print">
-              <a:extLst>
-                <a:ext uri="{28A0092B-C50C-407E-A947-70E740481C1C}">
-                  <a14:useLocalDpi xmlns:a14="http://schemas.microsoft.com/office/drawing/2010/main" val="0"/>
-                </a:ext>
-              </a:extLst>
-            </a:blip>
-            <a:stretch>
-              <a:fillRect/>
-            </a:stretch>
-          </p:blipFill>
-          <p:spPr>
-            <a:xfrm>
-              <a:off x="0" y="0"/>
-              <a:ext cx="12192000" cy="6858000"/>
-            </a:xfrm>
-            <a:prstGeom prst="rect">
-              <a:avLst/>
-            </a:prstGeom>
-            <a:noFill/>
-          </p:spPr>
-        </p:pic>
-        <p:sp>
-          <p:nvSpPr>
-            <p:cNvPr id="11" name="Overlay"/>
-            <p:cNvSpPr/>
-            <p:nvPr/>
-          </p:nvSpPr>
-          <p:spPr>
-            <a:xfrm>
-              <a:off x="0" y="0"/>
-              <a:ext cx="12195263" cy="6858000"/>
-            </a:xfrm>
-            <a:prstGeom prst="rect">
-              <a:avLst/>
-            </a:prstGeom>
-            <a:solidFill>
-              <a:srgbClr val="443E62">
-                <a:alpha val="89804"/>
-              </a:srgbClr>
-            </a:solidFill>
-            <a:ln>
-              <a:noFill/>
-            </a:ln>
-          </p:spPr>
-          <p:style>
-            <a:lnRef idx="2">
-              <a:schemeClr val="accent1">
-                <a:shade val="50000"/>
-              </a:schemeClr>
-            </a:lnRef>
-            <a:fillRef idx="1">
-              <a:schemeClr val="accent1"/>
-            </a:fillRef>
-            <a:effectRef idx="0">
-              <a:schemeClr val="accent1"/>
-            </a:effectRef>
-            <a:fontRef idx="minor">
-              <a:schemeClr val="lt1"/>
-            </a:fontRef>
-          </p:style>
-          <p:txBody>
-            <a:bodyPr rtlCol="0" anchor="ctr"/>
-            <a:lstStyle/>
-            <a:p>
-              <a:pPr algn="ctr"/>
-              <a:endParaRPr lang="en-US"/>
-            </a:p>
-          </p:txBody>
-        </p:sp>
-      </p:grpSp>
       <p:sp>
         <p:nvSpPr>
           <p:cNvPr id="2" name="Title 1"/>
@@ -6661,8 +6628,8 @@
         </p:nvSpPr>
         <p:spPr>
           <a:xfrm>
-            <a:off x="1524000" y="2422998"/>
-            <a:ext cx="9144000" cy="2387600"/>
+            <a:off x="1143000" y="2674499"/>
+            <a:ext cx="6858000" cy="1790700"/>
           </a:xfrm>
           <a:effectLst>
             <a:outerShdw blurRad="50800" dist="38100" dir="2700000" algn="tl" rotWithShape="0">
@@ -6679,7 +6646,7 @@
           <a:lstStyle/>
           <a:p>
             <a:r>
-              <a:rPr lang="en-US" sz="8000" i="1" dirty="0" smtClean="0">
+              <a:rPr lang="en-US" sz="6000" i="1" dirty="0">
                 <a:ln w="6350">
                   <a:solidFill>
                     <a:srgbClr val="88873C"/>
@@ -6694,7 +6661,7 @@
               </a:rPr>
               <a:t>dvcoders</a:t>
             </a:r>
-            <a:endParaRPr lang="en-US" sz="8000" i="1" dirty="0">
+            <a:endParaRPr lang="en-US" sz="6000" i="1" dirty="0">
               <a:ln w="6350">
                 <a:solidFill>
                   <a:srgbClr val="88873C"/>
@@ -6722,8 +6689,8 @@
         </p:nvSpPr>
         <p:spPr>
           <a:xfrm>
-            <a:off x="1524000" y="4925069"/>
-            <a:ext cx="9144000" cy="1655762"/>
+            <a:off x="1143000" y="4551052"/>
+            <a:ext cx="6858000" cy="1241822"/>
           </a:xfrm>
           <a:effectLst>
             <a:outerShdw blurRad="50800" dist="38100" dir="2700000" algn="tl" rotWithShape="0">
@@ -6748,7 +6715,7 @@
               </a:spcBef>
             </a:pPr>
             <a:r>
-              <a:rPr lang="en-US" sz="3200" dirty="0" smtClean="0">
+              <a:rPr lang="en-US" sz="2400" dirty="0">
                 <a:solidFill>
                   <a:schemeClr val="bg1"/>
                 </a:solidFill>
@@ -6769,7 +6736,7 @@
               </a:spcBef>
             </a:pPr>
             <a:r>
-              <a:rPr lang="en-US" sz="2000" dirty="0" smtClean="0">
+              <a:rPr lang="en-US" sz="1500" dirty="0">
                 <a:solidFill>
                   <a:srgbClr val="E7E7ED"/>
                 </a:solidFill>
@@ -6790,7 +6757,7 @@
               </a:spcBef>
             </a:pPr>
             <a:r>
-              <a:rPr lang="en-US" sz="2000" dirty="0" smtClean="0">
+              <a:rPr lang="en-US" sz="1500" dirty="0">
                 <a:solidFill>
                   <a:srgbClr val="E7E7ED"/>
                 </a:solidFill>
@@ -6811,8 +6778,8 @@
         </p:nvGrpSpPr>
         <p:grpSpPr>
           <a:xfrm>
-            <a:off x="4902708" y="930282"/>
-            <a:ext cx="2386584" cy="2402658"/>
+            <a:off x="3677031" y="1554961"/>
+            <a:ext cx="1789938" cy="1801994"/>
             <a:chOff x="4902708" y="1235825"/>
             <a:chExt cx="2386584" cy="2402658"/>
           </a:xfrm>
@@ -6870,7 +6837,7 @@
             <a:lstStyle/>
             <a:p>
               <a:pPr algn="ctr"/>
-              <a:endParaRPr lang="en-US"/>
+              <a:endParaRPr lang="en-US" sz="1350"/>
             </a:p>
           </p:txBody>
         </p:sp>
@@ -6883,11 +6850,11 @@
             <p:nvPr/>
           </p:nvPicPr>
           <p:blipFill>
-            <a:blip r:embed="rId4" cstate="print">
+            <a:blip r:embed="rId3" cstate="print">
               <a:extLst>
                 <a:ext uri="{BEBA8EAE-BF5A-486C-A8C5-ECC9F3942E4B}">
                   <a14:imgProps xmlns:a14="http://schemas.microsoft.com/office/drawing/2010/main">
-                    <a14:imgLayer r:embed="rId5">
+                    <a14:imgLayer r:embed="rId4">
                       <a14:imgEffect>
                         <a14:colorTemperature colorTemp="6600"/>
                       </a14:imgEffect>
@@ -6955,7 +6922,7 @@
 <file path=ppt/theme/theme1.xml><?xml version="1.0" encoding="utf-8"?>
 <a:theme xmlns:a="http://schemas.openxmlformats.org/drawingml/2006/main" name="Office Theme">
   <a:themeElements>
-    <a:clrScheme name="Office">
+    <a:clrScheme name="Office Theme">
       <a:dk1>
         <a:sysClr val="windowText" lastClr="000000"/>
       </a:dk1>
@@ -6993,7 +6960,7 @@
         <a:srgbClr val="954F72"/>
       </a:folHlink>
     </a:clrScheme>
-    <a:fontScheme name="Office">
+    <a:fontScheme name="Office Theme">
       <a:majorFont>
         <a:latin typeface="Calibri Light" panose="020F0302020204030204"/>
         <a:ea typeface=""/>
@@ -7065,7 +7032,7 @@
         <a:font script="Geor" typeface="Sylfaen"/>
       </a:minorFont>
     </a:fontScheme>
-    <a:fmtScheme name="Office">
+    <a:fmtScheme name="Office Theme">
       <a:fillStyleLst>
         <a:solidFill>
           <a:schemeClr val="phClr"/>

</xml_diff>